<commit_message>
Added some pictures, I think
</commit_message>
<xml_diff>
--- a/Berkeley DB.pptx
+++ b/Berkeley DB.pptx
@@ -126,6 +126,18 @@
 </p:presentation>
 </file>
 
+<file path=ppt/commentAuthors.xml><?xml version="1.0" encoding="utf-8"?>
+<p:cmAuthorLst xmlns:a="http://schemas.openxmlformats.org/drawingml/2006/main" xmlns:r="http://schemas.openxmlformats.org/officeDocument/2006/relationships" xmlns:p="http://schemas.openxmlformats.org/presentationml/2006/main">
+  <p:cmAuthor id="1" name="Laan,Lucas L.S. van der" initials="LLvd" lastIdx="1" clrIdx="0">
+    <p:extLst>
+      <p:ext uri="{19B8F6BF-5375-455C-9EA6-DF929625EA0E}">
+        <p15:presenceInfo xmlns:p15="http://schemas.microsoft.com/office/powerpoint/2012/main" userId="S::386756@student.fontys.nl::146c2c56-b330-44ea-bab0-2ea291a70463" providerId="AD"/>
+      </p:ext>
+    </p:extLst>
+  </p:cmAuthor>
+</p:cmAuthorLst>
+</file>
+
 <file path=ppt/revisionInfo.xml><?xml version="1.0" encoding="utf-8"?>
 <p1510:revInfo xmlns:a="http://schemas.openxmlformats.org/drawingml/2006/main" xmlns:r="http://schemas.openxmlformats.org/officeDocument/2006/relationships" xmlns:p1510="http://schemas.microsoft.com/office/powerpoint/2015/10/main">
   <p1510:revLst>
@@ -374,7 +386,7 @@
           <a:p>
             <a:fld id="{2C1893C1-AA60-43C7-A9DB-CA01F4DE58A1}" type="slidenum">
               <a:rPr lang="en-US" smtClean="0"/>
-              <a:t>‹nr.›</a:t>
+              <a:t>‹#›</a:t>
             </a:fld>
             <a:endParaRPr lang="en-US"/>
           </a:p>
@@ -756,7 +768,7 @@
           <a:p>
             <a:fld id="{2C1893C1-AA60-43C7-A9DB-CA01F4DE58A1}" type="slidenum">
               <a:rPr lang="en-US" smtClean="0"/>
-              <a:t>‹nr.›</a:t>
+              <a:t>3</a:t>
             </a:fld>
             <a:endParaRPr lang="en-US"/>
           </a:p>
@@ -865,7 +877,7 @@
           <a:p>
             <a:fld id="{2C1893C1-AA60-43C7-A9DB-CA01F4DE58A1}" type="slidenum">
               <a:rPr lang="en-US" smtClean="0"/>
-              <a:t>3</a:t>
+              <a:t>4</a:t>
             </a:fld>
             <a:endParaRPr lang="en-US"/>
           </a:p>
@@ -1017,7 +1029,7 @@
           <a:p>
             <a:fld id="{2C1893C1-AA60-43C7-A9DB-CA01F4DE58A1}" type="slidenum">
               <a:rPr lang="en-US" smtClean="0"/>
-              <a:t>4</a:t>
+              <a:t>5</a:t>
             </a:fld>
             <a:endParaRPr lang="en-US"/>
           </a:p>
@@ -1027,6 +1039,181 @@
     <p:extLst>
       <p:ext uri="{BB962C8B-B14F-4D97-AF65-F5344CB8AC3E}">
         <p14:creationId xmlns:p14="http://schemas.microsoft.com/office/powerpoint/2010/main" val="3408184231"/>
+      </p:ext>
+    </p:extLst>
+  </p:cSld>
+  <p:clrMapOvr>
+    <a:masterClrMapping/>
+  </p:clrMapOvr>
+</p:notes>
+</file>
+
+<file path=ppt/notesSlides/notesSlide6.xml><?xml version="1.0" encoding="utf-8"?>
+<p:notes xmlns:a="http://schemas.openxmlformats.org/drawingml/2006/main" xmlns:r="http://schemas.openxmlformats.org/officeDocument/2006/relationships" xmlns:p="http://schemas.openxmlformats.org/presentationml/2006/main">
+  <p:cSld>
+    <p:spTree>
+      <p:nvGrpSpPr>
+        <p:cNvPr id="1" name=""/>
+        <p:cNvGrpSpPr/>
+        <p:nvPr/>
+      </p:nvGrpSpPr>
+      <p:grpSpPr>
+        <a:xfrm>
+          <a:off x="0" y="0"/>
+          <a:ext cx="0" cy="0"/>
+          <a:chOff x="0" y="0"/>
+          <a:chExt cx="0" cy="0"/>
+        </a:xfrm>
+      </p:grpSpPr>
+      <p:sp>
+        <p:nvSpPr>
+          <p:cNvPr id="2" name="Slide Image Placeholder 1"/>
+          <p:cNvSpPr>
+            <a:spLocks noGrp="1" noRot="1" noChangeAspect="1"/>
+          </p:cNvSpPr>
+          <p:nvPr>
+            <p:ph type="sldImg"/>
+          </p:nvPr>
+        </p:nvSpPr>
+        <p:spPr/>
+      </p:sp>
+      <p:sp>
+        <p:nvSpPr>
+          <p:cNvPr id="3" name="Notes Placeholder 2"/>
+          <p:cNvSpPr>
+            <a:spLocks noGrp="1"/>
+          </p:cNvSpPr>
+          <p:nvPr>
+            <p:ph type="body" idx="1"/>
+          </p:nvPr>
+        </p:nvSpPr>
+        <p:spPr/>
+        <p:txBody>
+          <a:bodyPr/>
+          <a:lstStyle/>
+          <a:p>
+            <a:r>
+              <a:rPr lang="en-US" dirty="0"/>
+              <a:t>ACID: Configured in the application (See transaction config)</a:t>
+            </a:r>
+          </a:p>
+        </p:txBody>
+      </p:sp>
+      <p:sp>
+        <p:nvSpPr>
+          <p:cNvPr id="4" name="Slide Number Placeholder 3"/>
+          <p:cNvSpPr>
+            <a:spLocks noGrp="1"/>
+          </p:cNvSpPr>
+          <p:nvPr>
+            <p:ph type="sldNum" sz="quarter" idx="5"/>
+          </p:nvPr>
+        </p:nvSpPr>
+        <p:spPr/>
+        <p:txBody>
+          <a:bodyPr/>
+          <a:lstStyle/>
+          <a:p>
+            <a:fld id="{2C1893C1-AA60-43C7-A9DB-CA01F4DE58A1}" type="slidenum">
+              <a:rPr lang="en-US" smtClean="0"/>
+              <a:t>6</a:t>
+            </a:fld>
+            <a:endParaRPr lang="en-US"/>
+          </a:p>
+        </p:txBody>
+      </p:sp>
+    </p:spTree>
+    <p:extLst>
+      <p:ext uri="{BB962C8B-B14F-4D97-AF65-F5344CB8AC3E}">
+        <p14:creationId xmlns:p14="http://schemas.microsoft.com/office/powerpoint/2010/main" val="2036789432"/>
+      </p:ext>
+    </p:extLst>
+  </p:cSld>
+  <p:clrMapOvr>
+    <a:masterClrMapping/>
+  </p:clrMapOvr>
+</p:notes>
+</file>
+
+<file path=ppt/notesSlides/notesSlide7.xml><?xml version="1.0" encoding="utf-8"?>
+<p:notes xmlns:a="http://schemas.openxmlformats.org/drawingml/2006/main" xmlns:r="http://schemas.openxmlformats.org/officeDocument/2006/relationships" xmlns:p="http://schemas.openxmlformats.org/presentationml/2006/main">
+  <p:cSld>
+    <p:spTree>
+      <p:nvGrpSpPr>
+        <p:cNvPr id="1" name=""/>
+        <p:cNvGrpSpPr/>
+        <p:nvPr/>
+      </p:nvGrpSpPr>
+      <p:grpSpPr>
+        <a:xfrm>
+          <a:off x="0" y="0"/>
+          <a:ext cx="0" cy="0"/>
+          <a:chOff x="0" y="0"/>
+          <a:chExt cx="0" cy="0"/>
+        </a:xfrm>
+      </p:grpSpPr>
+      <p:sp>
+        <p:nvSpPr>
+          <p:cNvPr id="2" name="Slide Image Placeholder 1"/>
+          <p:cNvSpPr>
+            <a:spLocks noGrp="1" noRot="1" noChangeAspect="1"/>
+          </p:cNvSpPr>
+          <p:nvPr>
+            <p:ph type="sldImg"/>
+          </p:nvPr>
+        </p:nvSpPr>
+        <p:spPr/>
+      </p:sp>
+      <p:sp>
+        <p:nvSpPr>
+          <p:cNvPr id="3" name="Notes Placeholder 2"/>
+          <p:cNvSpPr>
+            <a:spLocks noGrp="1"/>
+          </p:cNvSpPr>
+          <p:nvPr>
+            <p:ph type="body" idx="1"/>
+          </p:nvPr>
+        </p:nvSpPr>
+        <p:spPr/>
+        <p:txBody>
+          <a:bodyPr/>
+          <a:lstStyle/>
+          <a:p>
+            <a:r>
+              <a:rPr lang="en-US" dirty="0"/>
+              <a:t>Amazon</a:t>
+            </a:r>
+            <a:endParaRPr lang="en-NL" dirty="0"/>
+          </a:p>
+        </p:txBody>
+      </p:sp>
+      <p:sp>
+        <p:nvSpPr>
+          <p:cNvPr id="4" name="Slide Number Placeholder 3"/>
+          <p:cNvSpPr>
+            <a:spLocks noGrp="1"/>
+          </p:cNvSpPr>
+          <p:nvPr>
+            <p:ph type="sldNum" sz="quarter" idx="5"/>
+          </p:nvPr>
+        </p:nvSpPr>
+        <p:spPr/>
+        <p:txBody>
+          <a:bodyPr/>
+          <a:lstStyle/>
+          <a:p>
+            <a:fld id="{2C1893C1-AA60-43C7-A9DB-CA01F4DE58A1}" type="slidenum">
+              <a:rPr lang="en-US" smtClean="0"/>
+              <a:t>8</a:t>
+            </a:fld>
+            <a:endParaRPr lang="en-US"/>
+          </a:p>
+        </p:txBody>
+      </p:sp>
+    </p:spTree>
+    <p:extLst>
+      <p:ext uri="{BB962C8B-B14F-4D97-AF65-F5344CB8AC3E}">
+        <p14:creationId xmlns:p14="http://schemas.microsoft.com/office/powerpoint/2010/main" val="2600212184"/>
       </p:ext>
     </p:extLst>
   </p:cSld>
@@ -1822,7 +2009,7 @@
           <a:p>
             <a:fld id="{B8B7A51C-7D5A-4AD6-B75A-512A51253CBA}" type="slidenum">
               <a:rPr lang="en-US" smtClean="0"/>
-              <a:t>‹nr.›</a:t>
+              <a:t>‹#›</a:t>
             </a:fld>
             <a:endParaRPr lang="en-US"/>
           </a:p>
@@ -2076,7 +2263,7 @@
           <a:p>
             <a:fld id="{B8B7A51C-7D5A-4AD6-B75A-512A51253CBA}" type="slidenum">
               <a:rPr lang="en-US" smtClean="0"/>
-              <a:t>‹nr.›</a:t>
+              <a:t>‹#›</a:t>
             </a:fld>
             <a:endParaRPr lang="en-US"/>
           </a:p>
@@ -2393,7 +2580,7 @@
           <a:p>
             <a:fld id="{B8B7A51C-7D5A-4AD6-B75A-512A51253CBA}" type="slidenum">
               <a:rPr lang="en-US" smtClean="0"/>
-              <a:t>‹nr.›</a:t>
+              <a:t>‹#›</a:t>
             </a:fld>
             <a:endParaRPr lang="en-US"/>
           </a:p>
@@ -2729,7 +2916,7 @@
           <a:p>
             <a:fld id="{B8B7A51C-7D5A-4AD6-B75A-512A51253CBA}" type="slidenum">
               <a:rPr lang="en-US" smtClean="0"/>
-              <a:t>‹nr.›</a:t>
+              <a:t>‹#›</a:t>
             </a:fld>
             <a:endParaRPr lang="en-US"/>
           </a:p>
@@ -3046,7 +3233,7 @@
           <a:p>
             <a:fld id="{B8B7A51C-7D5A-4AD6-B75A-512A51253CBA}" type="slidenum">
               <a:rPr lang="en-US" smtClean="0"/>
-              <a:t>‹nr.›</a:t>
+              <a:t>‹#›</a:t>
             </a:fld>
             <a:endParaRPr lang="en-US"/>
           </a:p>
@@ -3442,7 +3629,7 @@
           <a:p>
             <a:fld id="{B8B7A51C-7D5A-4AD6-B75A-512A51253CBA}" type="slidenum">
               <a:rPr lang="en-US" smtClean="0"/>
-              <a:t>‹nr.›</a:t>
+              <a:t>‹#›</a:t>
             </a:fld>
             <a:endParaRPr lang="en-US"/>
           </a:p>
@@ -3615,7 +3802,7 @@
           <a:p>
             <a:fld id="{B8B7A51C-7D5A-4AD6-B75A-512A51253CBA}" type="slidenum">
               <a:rPr lang="en-US" smtClean="0"/>
-              <a:t>‹nr.›</a:t>
+              <a:t>‹#›</a:t>
             </a:fld>
             <a:endParaRPr lang="en-US"/>
           </a:p>
@@ -3798,7 +3985,7 @@
           <a:p>
             <a:fld id="{B8B7A51C-7D5A-4AD6-B75A-512A51253CBA}" type="slidenum">
               <a:rPr lang="en-US" smtClean="0"/>
-              <a:t>‹nr.›</a:t>
+              <a:t>‹#›</a:t>
             </a:fld>
             <a:endParaRPr lang="en-US"/>
           </a:p>
@@ -3971,7 +4158,7 @@
           <a:p>
             <a:fld id="{B8B7A51C-7D5A-4AD6-B75A-512A51253CBA}" type="slidenum">
               <a:rPr lang="en-US" smtClean="0"/>
-              <a:t>‹nr.›</a:t>
+              <a:t>‹#›</a:t>
             </a:fld>
             <a:endParaRPr lang="en-US"/>
           </a:p>
@@ -4221,7 +4408,7 @@
           <a:p>
             <a:fld id="{B8B7A51C-7D5A-4AD6-B75A-512A51253CBA}" type="slidenum">
               <a:rPr lang="en-US" smtClean="0"/>
-              <a:t>‹nr.›</a:t>
+              <a:t>‹#›</a:t>
             </a:fld>
             <a:endParaRPr lang="en-US"/>
           </a:p>
@@ -4456,7 +4643,7 @@
           <a:p>
             <a:fld id="{B8B7A51C-7D5A-4AD6-B75A-512A51253CBA}" type="slidenum">
               <a:rPr lang="en-US" smtClean="0"/>
-              <a:t>‹nr.›</a:t>
+              <a:t>‹#›</a:t>
             </a:fld>
             <a:endParaRPr lang="en-US"/>
           </a:p>
@@ -4838,7 +5025,7 @@
           <a:p>
             <a:fld id="{B8B7A51C-7D5A-4AD6-B75A-512A51253CBA}" type="slidenum">
               <a:rPr lang="en-US" smtClean="0"/>
-              <a:t>‹nr.›</a:t>
+              <a:t>‹#›</a:t>
             </a:fld>
             <a:endParaRPr lang="en-US"/>
           </a:p>
@@ -4969,7 +5156,7 @@
           <a:p>
             <a:fld id="{B8B7A51C-7D5A-4AD6-B75A-512A51253CBA}" type="slidenum">
               <a:rPr lang="en-US" smtClean="0"/>
-              <a:t>‹nr.›</a:t>
+              <a:t>‹#›</a:t>
             </a:fld>
             <a:endParaRPr lang="en-US"/>
           </a:p>
@@ -5067,7 +5254,7 @@
           <a:p>
             <a:fld id="{B8B7A51C-7D5A-4AD6-B75A-512A51253CBA}" type="slidenum">
               <a:rPr lang="en-US" smtClean="0"/>
-              <a:t>‹nr.›</a:t>
+              <a:t>‹#›</a:t>
             </a:fld>
             <a:endParaRPr lang="en-US"/>
           </a:p>
@@ -5325,7 +5512,7 @@
           <a:p>
             <a:fld id="{B8B7A51C-7D5A-4AD6-B75A-512A51253CBA}" type="slidenum">
               <a:rPr lang="en-US" smtClean="0"/>
-              <a:t>‹nr.›</a:t>
+              <a:t>‹#›</a:t>
             </a:fld>
             <a:endParaRPr lang="en-US"/>
           </a:p>
@@ -5573,7 +5760,7 @@
           <a:p>
             <a:fld id="{B8B7A51C-7D5A-4AD6-B75A-512A51253CBA}" type="slidenum">
               <a:rPr lang="en-US" smtClean="0"/>
-              <a:t>‹nr.›</a:t>
+              <a:t>‹#›</a:t>
             </a:fld>
             <a:endParaRPr lang="en-US"/>
           </a:p>
@@ -6376,7 +6563,7 @@
           <a:p>
             <a:fld id="{B8B7A51C-7D5A-4AD6-B75A-512A51253CBA}" type="slidenum">
               <a:rPr lang="en-US" smtClean="0"/>
-              <a:t>‹nr.›</a:t>
+              <a:t>‹#›</a:t>
             </a:fld>
             <a:endParaRPr lang="en-US"/>
           </a:p>
@@ -7736,7 +7923,7 @@
               <a:rPr lang="en-US" dirty="0"/>
               <a:t>Berkeley DB Specifics</a:t>
             </a:r>
-            <a:endParaRPr lang="nl-NL"/>
+            <a:endParaRPr lang="nl-NL" dirty="0"/>
           </a:p>
           <a:p>
             <a:pPr marL="0" indent="0">
@@ -7897,6 +8084,89 @@
           </a:p>
         </p:txBody>
       </p:sp>
+      <p:pic>
+        <p:nvPicPr>
+          <p:cNvPr id="5" name="Picture 4">
+            <a:extLst>
+              <a:ext uri="{FF2B5EF4-FFF2-40B4-BE49-F238E27FC236}">
+                <a16:creationId xmlns:a16="http://schemas.microsoft.com/office/drawing/2014/main" id="{3394960A-5957-4D87-AAF1-4850F49289D8}"/>
+              </a:ext>
+            </a:extLst>
+          </p:cNvPr>
+          <p:cNvPicPr>
+            <a:picLocks noChangeAspect="1"/>
+          </p:cNvPicPr>
+          <p:nvPr/>
+        </p:nvPicPr>
+        <p:blipFill>
+          <a:blip r:embed="rId3">
+            <a:extLst>
+              <a:ext uri="{28A0092B-C50C-407E-A947-70E740481C1C}">
+                <a14:useLocalDpi xmlns:a14="http://schemas.microsoft.com/office/drawing/2010/main" val="0"/>
+              </a:ext>
+            </a:extLst>
+          </a:blip>
+          <a:stretch>
+            <a:fillRect/>
+          </a:stretch>
+        </p:blipFill>
+        <p:spPr>
+          <a:xfrm>
+            <a:off x="5270943" y="1694359"/>
+            <a:ext cx="5663757" cy="1408174"/>
+          </a:xfrm>
+          <a:prstGeom prst="rect">
+            <a:avLst/>
+          </a:prstGeom>
+        </p:spPr>
+      </p:pic>
+      <p:sp>
+        <p:nvSpPr>
+          <p:cNvPr id="6" name="Rectangle 5">
+            <a:extLst>
+              <a:ext uri="{FF2B5EF4-FFF2-40B4-BE49-F238E27FC236}">
+                <a16:creationId xmlns:a16="http://schemas.microsoft.com/office/drawing/2014/main" id="{3A540B5E-E1AC-45C2-AD8D-765C2E433DF1}"/>
+              </a:ext>
+            </a:extLst>
+          </p:cNvPr>
+          <p:cNvSpPr/>
+          <p:nvPr/>
+        </p:nvSpPr>
+        <p:spPr>
+          <a:xfrm>
+            <a:off x="5618691" y="3102533"/>
+            <a:ext cx="4563534" cy="200055"/>
+          </a:xfrm>
+          <a:prstGeom prst="rect">
+            <a:avLst/>
+          </a:prstGeom>
+        </p:spPr>
+        <p:txBody>
+          <a:bodyPr wrap="square">
+            <a:spAutoFit/>
+          </a:bodyPr>
+          <a:lstStyle/>
+          <a:p>
+            <a:r>
+              <a:rPr lang="en-US" sz="700" dirty="0">
+                <a:solidFill>
+                  <a:schemeClr val="bg1">
+                    <a:lumMod val="65000"/>
+                  </a:schemeClr>
+                </a:solidFill>
+              </a:rPr>
+              <a:t>http://highscalability.com/blog/2012/11/29/performance-data-for-leveldb-berkley-db-and-bangdb-for-rando.html</a:t>
+            </a:r>
+            <a:endParaRPr lang="en-NL" sz="700" dirty="0">
+              <a:solidFill>
+                <a:schemeClr val="bg1">
+                  <a:lumMod val="65000"/>
+                </a:schemeClr>
+              </a:solidFill>
+            </a:endParaRPr>
+          </a:p>
+        </p:txBody>
+      </p:sp>
     </p:spTree>
     <p:extLst>
       <p:ext uri="{BB962C8B-B14F-4D97-AF65-F5344CB8AC3E}">
@@ -7952,7 +8222,7 @@
           <a:lstStyle/>
           <a:p>
             <a:r>
-              <a:rPr lang="nl-NL" dirty="0" err="1"/>
+              <a:rPr lang="en-US" dirty="0"/>
               <a:t>Principles</a:t>
             </a:r>
             <a:r>
@@ -8116,6 +8386,76 @@
             <a:r>
               <a:rPr lang="en-US" dirty="0"/>
               <a:t>Other</a:t>
+            </a:r>
+          </a:p>
+        </p:txBody>
+      </p:sp>
+      <p:pic>
+        <p:nvPicPr>
+          <p:cNvPr id="4" name="Picture 3">
+            <a:extLst>
+              <a:ext uri="{FF2B5EF4-FFF2-40B4-BE49-F238E27FC236}">
+                <a16:creationId xmlns:a16="http://schemas.microsoft.com/office/drawing/2014/main" id="{8E4A5EAB-DDF4-4FB9-B891-B782DEA428D7}"/>
+              </a:ext>
+            </a:extLst>
+          </p:cNvPr>
+          <p:cNvPicPr>
+            <a:picLocks noChangeAspect="1"/>
+          </p:cNvPicPr>
+          <p:nvPr/>
+        </p:nvPicPr>
+        <p:blipFill>
+          <a:blip r:embed="rId3"/>
+          <a:stretch>
+            <a:fillRect/>
+          </a:stretch>
+        </p:blipFill>
+        <p:spPr>
+          <a:xfrm>
+            <a:off x="3771087" y="816638"/>
+            <a:ext cx="8016944" cy="3329338"/>
+          </a:xfrm>
+          <a:prstGeom prst="rect">
+            <a:avLst/>
+          </a:prstGeom>
+        </p:spPr>
+      </p:pic>
+      <p:sp>
+        <p:nvSpPr>
+          <p:cNvPr id="5" name="Rectangle 4">
+            <a:extLst>
+              <a:ext uri="{FF2B5EF4-FFF2-40B4-BE49-F238E27FC236}">
+                <a16:creationId xmlns:a16="http://schemas.microsoft.com/office/drawing/2014/main" id="{1C89EC71-0A53-4274-9083-E500B449356B}"/>
+              </a:ext>
+            </a:extLst>
+          </p:cNvPr>
+          <p:cNvSpPr/>
+          <p:nvPr/>
+        </p:nvSpPr>
+        <p:spPr>
+          <a:xfrm>
+            <a:off x="4618307" y="4191499"/>
+            <a:ext cx="2754280" cy="215444"/>
+          </a:xfrm>
+          <a:prstGeom prst="rect">
+            <a:avLst/>
+          </a:prstGeom>
+        </p:spPr>
+        <p:txBody>
+          <a:bodyPr wrap="none">
+            <a:spAutoFit/>
+          </a:bodyPr>
+          <a:lstStyle/>
+          <a:p>
+            <a:r>
+              <a:rPr lang="en-NL" sz="800" dirty="0">
+                <a:solidFill>
+                  <a:schemeClr val="bg1">
+                    <a:lumMod val="65000"/>
+                  </a:schemeClr>
+                </a:solidFill>
+              </a:rPr>
+              <a:t>https://discovery.hgdata.com/product/oracle-berkeley-db</a:t>
             </a:r>
           </a:p>
         </p:txBody>

</xml_diff>

<commit_message>
added when to use and not to use to ppt
</commit_message>
<xml_diff>
--- a/Berkeley DB.pptx
+++ b/Berkeley DB.pptx
@@ -5,7 +5,7 @@
     <p:sldMasterId id="2147483689" r:id="rId1"/>
   </p:sldMasterIdLst>
   <p:notesMasterIdLst>
-    <p:notesMasterId r:id="rId11"/>
+    <p:notesMasterId r:id="rId13"/>
   </p:notesMasterIdLst>
   <p:sldIdLst>
     <p:sldId id="256" r:id="rId2"/>
@@ -13,10 +13,12 @@
     <p:sldId id="264" r:id="rId4"/>
     <p:sldId id="258" r:id="rId5"/>
     <p:sldId id="262" r:id="rId6"/>
-    <p:sldId id="259" r:id="rId7"/>
-    <p:sldId id="263" r:id="rId8"/>
-    <p:sldId id="260" r:id="rId9"/>
-    <p:sldId id="261" r:id="rId10"/>
+    <p:sldId id="265" r:id="rId7"/>
+    <p:sldId id="266" r:id="rId8"/>
+    <p:sldId id="259" r:id="rId9"/>
+    <p:sldId id="263" r:id="rId10"/>
+    <p:sldId id="260" r:id="rId11"/>
+    <p:sldId id="261" r:id="rId12"/>
   </p:sldIdLst>
   <p:sldSz cx="12192000" cy="6858000"/>
   <p:notesSz cx="6858000" cy="9144000"/>
@@ -138,14 +140,6 @@
 </p:cmAuthorLst>
 </file>
 
-<file path=ppt/revisionInfo.xml><?xml version="1.0" encoding="utf-8"?>
-<p1510:revInfo xmlns:a="http://schemas.openxmlformats.org/drawingml/2006/main" xmlns:r="http://schemas.openxmlformats.org/officeDocument/2006/relationships" xmlns:p1510="http://schemas.microsoft.com/office/powerpoint/2015/10/main">
-  <p1510:revLst>
-    <p1510:client id="{5C3F93C2-9599-BF32-12AD-CE6A846912EA}" v="73" dt="2019-04-19T13:34:36.799"/>
-  </p1510:revLst>
-</p1510:revInfo>
-</file>
-
 <file path=ppt/notesMasters/notesMaster1.xml><?xml version="1.0" encoding="utf-8"?>
 <p:notesMaster xmlns:a="http://schemas.openxmlformats.org/drawingml/2006/main" xmlns:r="http://schemas.openxmlformats.org/officeDocument/2006/relationships" xmlns:p="http://schemas.openxmlformats.org/presentationml/2006/main">
   <p:cSld>
@@ -228,7 +222,7 @@
           <a:p>
             <a:fld id="{A1383F16-8A8E-4552-9D51-76A44C643563}" type="datetimeFigureOut">
               <a:rPr lang="en-US" smtClean="0"/>
-              <a:t>4/19/2019</a:t>
+              <a:t>4/21/2019</a:t>
             </a:fld>
             <a:endParaRPr lang="en-US"/>
           </a:p>
@@ -386,7 +380,7 @@
           <a:p>
             <a:fld id="{2C1893C1-AA60-43C7-A9DB-CA01F4DE58A1}" type="slidenum">
               <a:rPr lang="en-US" smtClean="0"/>
-              <a:t>‹#›</a:t>
+              <a:t>‹nr.›</a:t>
             </a:fld>
             <a:endParaRPr lang="en-US"/>
           </a:p>
@@ -1067,7 +1061,7 @@
       </p:grpSpPr>
       <p:sp>
         <p:nvSpPr>
-          <p:cNvPr id="2" name="Slide Image Placeholder 1"/>
+          <p:cNvPr id="2" name="Tijdelijke aanduiding voor dia-afbeelding 1"/>
           <p:cNvSpPr>
             <a:spLocks noGrp="1" noRot="1" noChangeAspect="1"/>
           </p:cNvSpPr>
@@ -1079,7 +1073,7 @@
       </p:sp>
       <p:sp>
         <p:nvSpPr>
-          <p:cNvPr id="3" name="Notes Placeholder 2"/>
+          <p:cNvPr id="3" name="Tijdelijke aanduiding voor notities 2"/>
           <p:cNvSpPr>
             <a:spLocks noGrp="1"/>
           </p:cNvSpPr>
@@ -1093,15 +1087,26 @@
           <a:lstStyle/>
           <a:p>
             <a:r>
-              <a:rPr lang="en-US" dirty="0"/>
-              <a:t>ACID: Configured in the application (See transaction config)</a:t>
-            </a:r>
-          </a:p>
-        </p:txBody>
-      </p:sp>
-      <p:sp>
-        <p:nvSpPr>
-          <p:cNvPr id="4" name="Slide Number Placeholder 3"/>
+              <a:rPr lang="en-US"/>
+              <a:t>-  especially when simple key-value queries AND because the queries can be coded up once -&gt; will run very quickly because there is no SQL to parse and execute.</a:t>
+            </a:r>
+          </a:p>
+          <a:p>
+            <a:r>
+              <a:rPr lang="en-US">
+                <a:cs typeface="Calibri"/>
+              </a:rPr>
+              <a:t>- because it is embedded into application</a:t>
+            </a:r>
+            <a:endParaRPr lang="en-US" dirty="0">
+              <a:cs typeface="Calibri"/>
+            </a:endParaRPr>
+          </a:p>
+        </p:txBody>
+      </p:sp>
+      <p:sp>
+        <p:nvSpPr>
+          <p:cNvPr id="4" name="Tijdelijke aanduiding voor dianummer 3"/>
           <p:cNvSpPr>
             <a:spLocks noGrp="1"/>
           </p:cNvSpPr>
@@ -1125,7 +1130,7 @@
     </p:spTree>
     <p:extLst>
       <p:ext uri="{BB962C8B-B14F-4D97-AF65-F5344CB8AC3E}">
-        <p14:creationId xmlns:p14="http://schemas.microsoft.com/office/powerpoint/2010/main" val="2036789432"/>
+        <p14:creationId xmlns:p14="http://schemas.microsoft.com/office/powerpoint/2010/main" val="1077308448"/>
       </p:ext>
     </p:extLst>
   </p:cSld>
@@ -1181,9 +1186,8 @@
           <a:p>
             <a:r>
               <a:rPr lang="en-US" dirty="0"/>
-              <a:t>Amazon</a:t>
-            </a:r>
-            <a:endParaRPr lang="en-NL" dirty="0"/>
+              <a:t>ACID: Configured in the application (See transaction config)</a:t>
+            </a:r>
           </a:p>
         </p:txBody>
       </p:sp>
@@ -1205,6 +1209,94 @@
             <a:fld id="{2C1893C1-AA60-43C7-A9DB-CA01F4DE58A1}" type="slidenum">
               <a:rPr lang="en-US" smtClean="0"/>
               <a:t>8</a:t>
+            </a:fld>
+            <a:endParaRPr lang="en-US"/>
+          </a:p>
+        </p:txBody>
+      </p:sp>
+    </p:spTree>
+    <p:extLst>
+      <p:ext uri="{BB962C8B-B14F-4D97-AF65-F5344CB8AC3E}">
+        <p14:creationId xmlns:p14="http://schemas.microsoft.com/office/powerpoint/2010/main" val="2036789432"/>
+      </p:ext>
+    </p:extLst>
+  </p:cSld>
+  <p:clrMapOvr>
+    <a:masterClrMapping/>
+  </p:clrMapOvr>
+</p:notes>
+</file>
+
+<file path=ppt/notesSlides/notesSlide8.xml><?xml version="1.0" encoding="utf-8"?>
+<p:notes xmlns:a="http://schemas.openxmlformats.org/drawingml/2006/main" xmlns:r="http://schemas.openxmlformats.org/officeDocument/2006/relationships" xmlns:p="http://schemas.openxmlformats.org/presentationml/2006/main">
+  <p:cSld>
+    <p:spTree>
+      <p:nvGrpSpPr>
+        <p:cNvPr id="1" name=""/>
+        <p:cNvGrpSpPr/>
+        <p:nvPr/>
+      </p:nvGrpSpPr>
+      <p:grpSpPr>
+        <a:xfrm>
+          <a:off x="0" y="0"/>
+          <a:ext cx="0" cy="0"/>
+          <a:chOff x="0" y="0"/>
+          <a:chExt cx="0" cy="0"/>
+        </a:xfrm>
+      </p:grpSpPr>
+      <p:sp>
+        <p:nvSpPr>
+          <p:cNvPr id="2" name="Slide Image Placeholder 1"/>
+          <p:cNvSpPr>
+            <a:spLocks noGrp="1" noRot="1" noChangeAspect="1"/>
+          </p:cNvSpPr>
+          <p:nvPr>
+            <p:ph type="sldImg"/>
+          </p:nvPr>
+        </p:nvSpPr>
+        <p:spPr/>
+      </p:sp>
+      <p:sp>
+        <p:nvSpPr>
+          <p:cNvPr id="3" name="Notes Placeholder 2"/>
+          <p:cNvSpPr>
+            <a:spLocks noGrp="1"/>
+          </p:cNvSpPr>
+          <p:nvPr>
+            <p:ph type="body" idx="1"/>
+          </p:nvPr>
+        </p:nvSpPr>
+        <p:spPr/>
+        <p:txBody>
+          <a:bodyPr/>
+          <a:lstStyle/>
+          <a:p>
+            <a:r>
+              <a:rPr lang="en-US" dirty="0"/>
+              <a:t>Amazon</a:t>
+            </a:r>
+            <a:endParaRPr lang="en-NL" dirty="0"/>
+          </a:p>
+        </p:txBody>
+      </p:sp>
+      <p:sp>
+        <p:nvSpPr>
+          <p:cNvPr id="4" name="Slide Number Placeholder 3"/>
+          <p:cNvSpPr>
+            <a:spLocks noGrp="1"/>
+          </p:cNvSpPr>
+          <p:nvPr>
+            <p:ph type="sldNum" sz="quarter" idx="5"/>
+          </p:nvPr>
+        </p:nvSpPr>
+        <p:spPr/>
+        <p:txBody>
+          <a:bodyPr/>
+          <a:lstStyle/>
+          <a:p>
+            <a:fld id="{2C1893C1-AA60-43C7-A9DB-CA01F4DE58A1}" type="slidenum">
+              <a:rPr lang="en-US" smtClean="0"/>
+              <a:t>10</a:t>
             </a:fld>
             <a:endParaRPr lang="en-US"/>
           </a:p>
@@ -1967,7 +2059,7 @@
           <a:p>
             <a:fld id="{2CF01A77-6A97-45A8-A952-2669B7F6690F}" type="datetimeFigureOut">
               <a:rPr lang="en-US" smtClean="0"/>
-              <a:t>4/19/2019</a:t>
+              <a:t>4/21/2019</a:t>
             </a:fld>
             <a:endParaRPr lang="en-US"/>
           </a:p>
@@ -2009,7 +2101,7 @@
           <a:p>
             <a:fld id="{B8B7A51C-7D5A-4AD6-B75A-512A51253CBA}" type="slidenum">
               <a:rPr lang="en-US" smtClean="0"/>
-              <a:t>‹#›</a:t>
+              <a:t>‹nr.›</a:t>
             </a:fld>
             <a:endParaRPr lang="en-US"/>
           </a:p>
@@ -2221,7 +2313,7 @@
           <a:p>
             <a:fld id="{2CF01A77-6A97-45A8-A952-2669B7F6690F}" type="datetimeFigureOut">
               <a:rPr lang="en-US" smtClean="0"/>
-              <a:t>4/19/2019</a:t>
+              <a:t>4/21/2019</a:t>
             </a:fld>
             <a:endParaRPr lang="en-US"/>
           </a:p>
@@ -2263,7 +2355,7 @@
           <a:p>
             <a:fld id="{B8B7A51C-7D5A-4AD6-B75A-512A51253CBA}" type="slidenum">
               <a:rPr lang="en-US" smtClean="0"/>
-              <a:t>‹#›</a:t>
+              <a:t>‹nr.›</a:t>
             </a:fld>
             <a:endParaRPr lang="en-US"/>
           </a:p>
@@ -2538,7 +2630,7 @@
           <a:p>
             <a:fld id="{2CF01A77-6A97-45A8-A952-2669B7F6690F}" type="datetimeFigureOut">
               <a:rPr lang="en-US" smtClean="0"/>
-              <a:t>4/19/2019</a:t>
+              <a:t>4/21/2019</a:t>
             </a:fld>
             <a:endParaRPr lang="en-US"/>
           </a:p>
@@ -2580,7 +2672,7 @@
           <a:p>
             <a:fld id="{B8B7A51C-7D5A-4AD6-B75A-512A51253CBA}" type="slidenum">
               <a:rPr lang="en-US" smtClean="0"/>
-              <a:t>‹#›</a:t>
+              <a:t>‹nr.›</a:t>
             </a:fld>
             <a:endParaRPr lang="en-US"/>
           </a:p>
@@ -2874,7 +2966,7 @@
           <a:p>
             <a:fld id="{2CF01A77-6A97-45A8-A952-2669B7F6690F}" type="datetimeFigureOut">
               <a:rPr lang="en-US" smtClean="0"/>
-              <a:t>4/19/2019</a:t>
+              <a:t>4/21/2019</a:t>
             </a:fld>
             <a:endParaRPr lang="en-US"/>
           </a:p>
@@ -2916,7 +3008,7 @@
           <a:p>
             <a:fld id="{B8B7A51C-7D5A-4AD6-B75A-512A51253CBA}" type="slidenum">
               <a:rPr lang="en-US" smtClean="0"/>
-              <a:t>‹#›</a:t>
+              <a:t>‹nr.›</a:t>
             </a:fld>
             <a:endParaRPr lang="en-US"/>
           </a:p>
@@ -3191,7 +3283,7 @@
           <a:p>
             <a:fld id="{2CF01A77-6A97-45A8-A952-2669B7F6690F}" type="datetimeFigureOut">
               <a:rPr lang="en-US" smtClean="0"/>
-              <a:t>4/19/2019</a:t>
+              <a:t>4/21/2019</a:t>
             </a:fld>
             <a:endParaRPr lang="en-US"/>
           </a:p>
@@ -3233,7 +3325,7 @@
           <a:p>
             <a:fld id="{B8B7A51C-7D5A-4AD6-B75A-512A51253CBA}" type="slidenum">
               <a:rPr lang="en-US" smtClean="0"/>
-              <a:t>‹#›</a:t>
+              <a:t>‹nr.›</a:t>
             </a:fld>
             <a:endParaRPr lang="en-US"/>
           </a:p>
@@ -3587,7 +3679,7 @@
           <a:p>
             <a:fld id="{2CF01A77-6A97-45A8-A952-2669B7F6690F}" type="datetimeFigureOut">
               <a:rPr lang="en-US" smtClean="0"/>
-              <a:t>4/19/2019</a:t>
+              <a:t>4/21/2019</a:t>
             </a:fld>
             <a:endParaRPr lang="en-US"/>
           </a:p>
@@ -3629,7 +3721,7 @@
           <a:p>
             <a:fld id="{B8B7A51C-7D5A-4AD6-B75A-512A51253CBA}" type="slidenum">
               <a:rPr lang="en-US" smtClean="0"/>
-              <a:t>‹#›</a:t>
+              <a:t>‹nr.›</a:t>
             </a:fld>
             <a:endParaRPr lang="en-US"/>
           </a:p>
@@ -3760,7 +3852,7 @@
           <a:p>
             <a:fld id="{2CF01A77-6A97-45A8-A952-2669B7F6690F}" type="datetimeFigureOut">
               <a:rPr lang="en-US" smtClean="0"/>
-              <a:t>4/19/2019</a:t>
+              <a:t>4/21/2019</a:t>
             </a:fld>
             <a:endParaRPr lang="en-US"/>
           </a:p>
@@ -3802,7 +3894,7 @@
           <a:p>
             <a:fld id="{B8B7A51C-7D5A-4AD6-B75A-512A51253CBA}" type="slidenum">
               <a:rPr lang="en-US" smtClean="0"/>
-              <a:t>‹#›</a:t>
+              <a:t>‹nr.›</a:t>
             </a:fld>
             <a:endParaRPr lang="en-US"/>
           </a:p>
@@ -3943,7 +4035,7 @@
           <a:p>
             <a:fld id="{2CF01A77-6A97-45A8-A952-2669B7F6690F}" type="datetimeFigureOut">
               <a:rPr lang="en-US" smtClean="0"/>
-              <a:t>4/19/2019</a:t>
+              <a:t>4/21/2019</a:t>
             </a:fld>
             <a:endParaRPr lang="en-US"/>
           </a:p>
@@ -3985,7 +4077,7 @@
           <a:p>
             <a:fld id="{B8B7A51C-7D5A-4AD6-B75A-512A51253CBA}" type="slidenum">
               <a:rPr lang="en-US" smtClean="0"/>
-              <a:t>‹#›</a:t>
+              <a:t>‹nr.›</a:t>
             </a:fld>
             <a:endParaRPr lang="en-US"/>
           </a:p>
@@ -4116,7 +4208,7 @@
           <a:p>
             <a:fld id="{2CF01A77-6A97-45A8-A952-2669B7F6690F}" type="datetimeFigureOut">
               <a:rPr lang="en-US" smtClean="0"/>
-              <a:t>4/19/2019</a:t>
+              <a:t>4/21/2019</a:t>
             </a:fld>
             <a:endParaRPr lang="en-US"/>
           </a:p>
@@ -4158,7 +4250,7 @@
           <a:p>
             <a:fld id="{B8B7A51C-7D5A-4AD6-B75A-512A51253CBA}" type="slidenum">
               <a:rPr lang="en-US" smtClean="0"/>
-              <a:t>‹#›</a:t>
+              <a:t>‹nr.›</a:t>
             </a:fld>
             <a:endParaRPr lang="en-US"/>
           </a:p>
@@ -4366,7 +4458,7 @@
           <a:p>
             <a:fld id="{2CF01A77-6A97-45A8-A952-2669B7F6690F}" type="datetimeFigureOut">
               <a:rPr lang="en-US" smtClean="0"/>
-              <a:t>4/19/2019</a:t>
+              <a:t>4/21/2019</a:t>
             </a:fld>
             <a:endParaRPr lang="en-US"/>
           </a:p>
@@ -4408,7 +4500,7 @@
           <a:p>
             <a:fld id="{B8B7A51C-7D5A-4AD6-B75A-512A51253CBA}" type="slidenum">
               <a:rPr lang="en-US" smtClean="0"/>
-              <a:t>‹#›</a:t>
+              <a:t>‹nr.›</a:t>
             </a:fld>
             <a:endParaRPr lang="en-US"/>
           </a:p>
@@ -4601,7 +4693,7 @@
           <a:p>
             <a:fld id="{2CF01A77-6A97-45A8-A952-2669B7F6690F}" type="datetimeFigureOut">
               <a:rPr lang="en-US" smtClean="0"/>
-              <a:t>4/19/2019</a:t>
+              <a:t>4/21/2019</a:t>
             </a:fld>
             <a:endParaRPr lang="en-US"/>
           </a:p>
@@ -4643,7 +4735,7 @@
           <a:p>
             <a:fld id="{B8B7A51C-7D5A-4AD6-B75A-512A51253CBA}" type="slidenum">
               <a:rPr lang="en-US" smtClean="0"/>
-              <a:t>‹#›</a:t>
+              <a:t>‹nr.›</a:t>
             </a:fld>
             <a:endParaRPr lang="en-US"/>
           </a:p>
@@ -4983,7 +5075,7 @@
           <a:p>
             <a:fld id="{2CF01A77-6A97-45A8-A952-2669B7F6690F}" type="datetimeFigureOut">
               <a:rPr lang="en-US" smtClean="0"/>
-              <a:t>4/19/2019</a:t>
+              <a:t>4/21/2019</a:t>
             </a:fld>
             <a:endParaRPr lang="en-US"/>
           </a:p>
@@ -5025,7 +5117,7 @@
           <a:p>
             <a:fld id="{B8B7A51C-7D5A-4AD6-B75A-512A51253CBA}" type="slidenum">
               <a:rPr lang="en-US" smtClean="0"/>
-              <a:t>‹#›</a:t>
+              <a:t>‹nr.›</a:t>
             </a:fld>
             <a:endParaRPr lang="en-US"/>
           </a:p>
@@ -5114,7 +5206,7 @@
           <a:p>
             <a:fld id="{2CF01A77-6A97-45A8-A952-2669B7F6690F}" type="datetimeFigureOut">
               <a:rPr lang="en-US" smtClean="0"/>
-              <a:t>4/19/2019</a:t>
+              <a:t>4/21/2019</a:t>
             </a:fld>
             <a:endParaRPr lang="en-US"/>
           </a:p>
@@ -5156,7 +5248,7 @@
           <a:p>
             <a:fld id="{B8B7A51C-7D5A-4AD6-B75A-512A51253CBA}" type="slidenum">
               <a:rPr lang="en-US" smtClean="0"/>
-              <a:t>‹#›</a:t>
+              <a:t>‹nr.›</a:t>
             </a:fld>
             <a:endParaRPr lang="en-US"/>
           </a:p>
@@ -5212,7 +5304,7 @@
           <a:p>
             <a:fld id="{2CF01A77-6A97-45A8-A952-2669B7F6690F}" type="datetimeFigureOut">
               <a:rPr lang="en-US" smtClean="0"/>
-              <a:t>4/19/2019</a:t>
+              <a:t>4/21/2019</a:t>
             </a:fld>
             <a:endParaRPr lang="en-US"/>
           </a:p>
@@ -5254,7 +5346,7 @@
           <a:p>
             <a:fld id="{B8B7A51C-7D5A-4AD6-B75A-512A51253CBA}" type="slidenum">
               <a:rPr lang="en-US" smtClean="0"/>
-              <a:t>‹#›</a:t>
+              <a:t>‹nr.›</a:t>
             </a:fld>
             <a:endParaRPr lang="en-US"/>
           </a:p>
@@ -5470,7 +5562,7 @@
           <a:p>
             <a:fld id="{2CF01A77-6A97-45A8-A952-2669B7F6690F}" type="datetimeFigureOut">
               <a:rPr lang="en-US" smtClean="0"/>
-              <a:t>4/19/2019</a:t>
+              <a:t>4/21/2019</a:t>
             </a:fld>
             <a:endParaRPr lang="en-US"/>
           </a:p>
@@ -5512,7 +5604,7 @@
           <a:p>
             <a:fld id="{B8B7A51C-7D5A-4AD6-B75A-512A51253CBA}" type="slidenum">
               <a:rPr lang="en-US" smtClean="0"/>
-              <a:t>‹#›</a:t>
+              <a:t>‹nr.›</a:t>
             </a:fld>
             <a:endParaRPr lang="en-US"/>
           </a:p>
@@ -5760,7 +5852,7 @@
           <a:p>
             <a:fld id="{B8B7A51C-7D5A-4AD6-B75A-512A51253CBA}" type="slidenum">
               <a:rPr lang="en-US" smtClean="0"/>
-              <a:t>‹#›</a:t>
+              <a:t>‹nr.›</a:t>
             </a:fld>
             <a:endParaRPr lang="en-US"/>
           </a:p>
@@ -5783,7 +5875,7 @@
           <a:p>
             <a:fld id="{2CF01A77-6A97-45A8-A952-2669B7F6690F}" type="datetimeFigureOut">
               <a:rPr lang="en-US" smtClean="0"/>
-              <a:t>4/19/2019</a:t>
+              <a:t>4/21/2019</a:t>
             </a:fld>
             <a:endParaRPr lang="en-US"/>
           </a:p>
@@ -6487,7 +6579,7 @@
           <a:p>
             <a:fld id="{2CF01A77-6A97-45A8-A952-2669B7F6690F}" type="datetimeFigureOut">
               <a:rPr lang="en-US" smtClean="0"/>
-              <a:t>4/19/2019</a:t>
+              <a:t>4/21/2019</a:t>
             </a:fld>
             <a:endParaRPr lang="en-US"/>
           </a:p>
@@ -6563,7 +6655,7 @@
           <a:p>
             <a:fld id="{B8B7A51C-7D5A-4AD6-B75A-512A51253CBA}" type="slidenum">
               <a:rPr lang="en-US" smtClean="0"/>
-              <a:t>‹#›</a:t>
+              <a:t>‹nr.›</a:t>
             </a:fld>
             <a:endParaRPr lang="en-US"/>
           </a:p>
@@ -7091,1221 +7183,7 @@
 </p:sld>
 </file>
 
-<file path=ppt/slides/slide2.xml><?xml version="1.0" encoding="utf-8"?>
-<p:sld xmlns:a="http://schemas.openxmlformats.org/drawingml/2006/main" xmlns:r="http://schemas.openxmlformats.org/officeDocument/2006/relationships" xmlns:p="http://schemas.openxmlformats.org/presentationml/2006/main">
-  <p:cSld>
-    <p:bg>
-      <p:bgPr>
-        <a:solidFill>
-          <a:schemeClr val="bg1"/>
-        </a:solidFill>
-        <a:effectLst/>
-      </p:bgPr>
-    </p:bg>
-    <p:spTree>
-      <p:nvGrpSpPr>
-        <p:cNvPr id="1" name=""/>
-        <p:cNvGrpSpPr/>
-        <p:nvPr/>
-      </p:nvGrpSpPr>
-      <p:grpSpPr>
-        <a:xfrm>
-          <a:off x="0" y="0"/>
-          <a:ext cx="0" cy="0"/>
-          <a:chOff x="0" y="0"/>
-          <a:chExt cx="0" cy="0"/>
-        </a:xfrm>
-      </p:grpSpPr>
-      <p:cxnSp>
-        <p:nvCxnSpPr>
-          <p:cNvPr id="8" name="Straight Connector 7">
-            <a:extLst>
-              <a:ext uri="{FF2B5EF4-FFF2-40B4-BE49-F238E27FC236}">
-                <a16:creationId xmlns:a16="http://schemas.microsoft.com/office/drawing/2014/main" id="{0B5F7E3B-C5F1-40E0-A491-558BAFBC1127}"/>
-              </a:ext>
-              <a:ext uri="{C183D7F6-B498-43B3-948B-1728B52AA6E4}">
-                <adec:decorative xmlns:adec="http://schemas.microsoft.com/office/drawing/2017/decorative" val="1"/>
-              </a:ext>
-            </a:extLst>
-          </p:cNvPr>
-          <p:cNvCxnSpPr>
-            <a:cxnSpLocks noGrp="1" noRot="1" noChangeAspect="1" noMove="1" noResize="1" noEditPoints="1" noAdjustHandles="1" noChangeArrowheads="1" noChangeShapeType="1"/>
-          </p:cNvCxnSpPr>
-          <p:nvPr>
-            <p:extLst>
-              <p:ext uri="{386F3935-93C4-4BCD-93E2-E3B085C9AB24}">
-                <p16:designElem xmlns:p16="http://schemas.microsoft.com/office/powerpoint/2015/main" val="1"/>
-              </p:ext>
-            </p:extLst>
-          </p:nvPr>
-        </p:nvCxnSpPr>
-        <p:spPr>
-          <a:xfrm>
-            <a:off x="4241804" y="1460500"/>
-            <a:ext cx="0" cy="3937000"/>
-          </a:xfrm>
-          <a:prstGeom prst="line">
-            <a:avLst/>
-          </a:prstGeom>
-        </p:spPr>
-        <p:style>
-          <a:lnRef idx="1">
-            <a:schemeClr val="accent1"/>
-          </a:lnRef>
-          <a:fillRef idx="0">
-            <a:schemeClr val="accent1"/>
-          </a:fillRef>
-          <a:effectRef idx="0">
-            <a:schemeClr val="accent1"/>
-          </a:effectRef>
-          <a:fontRef idx="minor">
-            <a:schemeClr val="tx1"/>
-          </a:fontRef>
-        </p:style>
-      </p:cxnSp>
-      <p:sp>
-        <p:nvSpPr>
-          <p:cNvPr id="2" name="Title 1">
-            <a:extLst>
-              <a:ext uri="{FF2B5EF4-FFF2-40B4-BE49-F238E27FC236}">
-                <a16:creationId xmlns:a16="http://schemas.microsoft.com/office/drawing/2014/main" id="{560179A6-9F4F-4FA2-806B-415F004AAFF9}"/>
-              </a:ext>
-            </a:extLst>
-          </p:cNvPr>
-          <p:cNvSpPr>
-            <a:spLocks noGrp="1"/>
-          </p:cNvSpPr>
-          <p:nvPr>
-            <p:ph type="title"/>
-          </p:nvPr>
-        </p:nvSpPr>
-        <p:spPr>
-          <a:xfrm>
-            <a:off x="643467" y="816638"/>
-            <a:ext cx="3367359" cy="5224724"/>
-          </a:xfrm>
-        </p:spPr>
-        <p:txBody>
-          <a:bodyPr anchor="ctr">
-            <a:normAutofit/>
-          </a:bodyPr>
-          <a:lstStyle/>
-          <a:p>
-            <a:r>
-              <a:rPr lang="en-US" dirty="0"/>
-              <a:t>Introduction</a:t>
-            </a:r>
-          </a:p>
-        </p:txBody>
-      </p:sp>
-      <p:sp>
-        <p:nvSpPr>
-          <p:cNvPr id="3" name="Content Placeholder 2">
-            <a:extLst>
-              <a:ext uri="{FF2B5EF4-FFF2-40B4-BE49-F238E27FC236}">
-                <a16:creationId xmlns:a16="http://schemas.microsoft.com/office/drawing/2014/main" id="{A0E81F03-58BC-4FC3-9CC8-FB84512531CA}"/>
-              </a:ext>
-            </a:extLst>
-          </p:cNvPr>
-          <p:cNvSpPr>
-            <a:spLocks noGrp="1"/>
-          </p:cNvSpPr>
-          <p:nvPr>
-            <p:ph idx="1"/>
-          </p:nvPr>
-        </p:nvSpPr>
-        <p:spPr>
-          <a:xfrm>
-            <a:off x="4654295" y="816638"/>
-            <a:ext cx="4619706" cy="5224724"/>
-          </a:xfrm>
-        </p:spPr>
-        <p:txBody>
-          <a:bodyPr anchor="ctr">
-            <a:normAutofit/>
-          </a:bodyPr>
-          <a:lstStyle/>
-          <a:p>
-            <a:r>
-              <a:rPr lang="en-US" dirty="0"/>
-              <a:t>Data Model</a:t>
-            </a:r>
-          </a:p>
-          <a:p>
-            <a:r>
-              <a:rPr lang="en-US" dirty="0"/>
-              <a:t>Principles of Berkeley DB</a:t>
-            </a:r>
-          </a:p>
-          <a:p>
-            <a:r>
-              <a:rPr lang="en-US" dirty="0"/>
-              <a:t>Economics</a:t>
-            </a:r>
-          </a:p>
-          <a:p>
-            <a:r>
-              <a:rPr lang="en-US" dirty="0"/>
-              <a:t>Demo</a:t>
-            </a:r>
-          </a:p>
-        </p:txBody>
-      </p:sp>
-    </p:spTree>
-    <p:extLst>
-      <p:ext uri="{BB962C8B-B14F-4D97-AF65-F5344CB8AC3E}">
-        <p14:creationId xmlns:p14="http://schemas.microsoft.com/office/powerpoint/2010/main" val="1986045945"/>
-      </p:ext>
-    </p:extLst>
-  </p:cSld>
-  <p:clrMapOvr>
-    <a:masterClrMapping/>
-  </p:clrMapOvr>
-  <p:transition spd="slow">
-    <p:push dir="u"/>
-  </p:transition>
-</p:sld>
-</file>
-
-<file path=ppt/slides/slide3.xml><?xml version="1.0" encoding="utf-8"?>
-<p:sld xmlns:a="http://schemas.openxmlformats.org/drawingml/2006/main" xmlns:r="http://schemas.openxmlformats.org/officeDocument/2006/relationships" xmlns:p="http://schemas.openxmlformats.org/presentationml/2006/main">
-  <p:cSld>
-    <p:spTree>
-      <p:nvGrpSpPr>
-        <p:cNvPr id="1" name=""/>
-        <p:cNvGrpSpPr/>
-        <p:nvPr/>
-      </p:nvGrpSpPr>
-      <p:grpSpPr>
-        <a:xfrm>
-          <a:off x="0" y="0"/>
-          <a:ext cx="0" cy="0"/>
-          <a:chOff x="0" y="0"/>
-          <a:chExt cx="0" cy="0"/>
-        </a:xfrm>
-      </p:grpSpPr>
-      <p:sp>
-        <p:nvSpPr>
-          <p:cNvPr id="2" name="Titel 1">
-            <a:extLst>
-              <a:ext uri="{FF2B5EF4-FFF2-40B4-BE49-F238E27FC236}">
-                <a16:creationId xmlns:a16="http://schemas.microsoft.com/office/drawing/2014/main" id="{52DCDA6A-EC0A-43DC-B8A2-CE81989E4364}"/>
-              </a:ext>
-            </a:extLst>
-          </p:cNvPr>
-          <p:cNvSpPr>
-            <a:spLocks noGrp="1"/>
-          </p:cNvSpPr>
-          <p:nvPr>
-            <p:ph type="title"/>
-          </p:nvPr>
-        </p:nvSpPr>
-        <p:spPr/>
-        <p:txBody>
-          <a:bodyPr/>
-          <a:lstStyle/>
-          <a:p>
-            <a:r>
-              <a:rPr lang="nl-NL" dirty="0"/>
-              <a:t>Data Model</a:t>
-            </a:r>
-          </a:p>
-        </p:txBody>
-      </p:sp>
-      <p:sp>
-        <p:nvSpPr>
-          <p:cNvPr id="3" name="Tijdelijke aanduiding voor inhoud 2">
-            <a:extLst>
-              <a:ext uri="{FF2B5EF4-FFF2-40B4-BE49-F238E27FC236}">
-                <a16:creationId xmlns:a16="http://schemas.microsoft.com/office/drawing/2014/main" id="{DF18D24E-576B-4C15-816F-FA9A0FC14902}"/>
-              </a:ext>
-            </a:extLst>
-          </p:cNvPr>
-          <p:cNvSpPr>
-            <a:spLocks noGrp="1"/>
-          </p:cNvSpPr>
-          <p:nvPr>
-            <p:ph idx="1"/>
-          </p:nvPr>
-        </p:nvSpPr>
-        <p:spPr/>
-        <p:txBody>
-          <a:bodyPr vert="horz" lIns="91440" tIns="45720" rIns="91440" bIns="45720" rtlCol="0" anchor="t">
-            <a:normAutofit/>
-          </a:bodyPr>
-          <a:lstStyle/>
-          <a:p>
-            <a:r>
-              <a:rPr lang="nl-NL" dirty="0" err="1"/>
-              <a:t>Key</a:t>
-            </a:r>
-            <a:r>
-              <a:rPr lang="nl-NL" dirty="0"/>
-              <a:t>-Value Store</a:t>
-            </a:r>
-          </a:p>
-          <a:p>
-            <a:r>
-              <a:rPr lang="nl-NL" dirty="0"/>
-              <a:t>Pros:</a:t>
-            </a:r>
-          </a:p>
-          <a:p>
-            <a:pPr lvl="1"/>
-            <a:r>
-              <a:rPr lang="nl-NL" dirty="0" err="1"/>
-              <a:t>Simplistic</a:t>
-            </a:r>
-          </a:p>
-          <a:p>
-            <a:pPr lvl="1"/>
-            <a:r>
-              <a:rPr lang="nl-NL" dirty="0" err="1"/>
-              <a:t>Flexible</a:t>
-            </a:r>
-          </a:p>
-          <a:p>
-            <a:pPr lvl="1"/>
-            <a:r>
-              <a:rPr lang="nl-NL" dirty="0" err="1"/>
-              <a:t>Scalable</a:t>
-            </a:r>
-          </a:p>
-          <a:p>
-            <a:pPr lvl="1"/>
-            <a:r>
-              <a:rPr lang="nl-NL" dirty="0"/>
-              <a:t>Performance</a:t>
-            </a:r>
-          </a:p>
-          <a:p>
-            <a:r>
-              <a:rPr lang="nl-NL" dirty="0" err="1"/>
-              <a:t>Cons</a:t>
-            </a:r>
-            <a:r>
-              <a:rPr lang="nl-NL" dirty="0"/>
-              <a:t>:</a:t>
-            </a:r>
-          </a:p>
-          <a:p>
-            <a:pPr lvl="1"/>
-            <a:r>
-              <a:rPr lang="nl-NL" dirty="0" err="1"/>
-              <a:t>Lack</a:t>
-            </a:r>
-            <a:r>
-              <a:rPr lang="nl-NL" dirty="0"/>
-              <a:t> of </a:t>
-            </a:r>
-            <a:r>
-              <a:rPr lang="nl-NL" dirty="0" err="1"/>
-              <a:t>Standardization</a:t>
-            </a:r>
-            <a:r>
-              <a:rPr lang="nl-NL" dirty="0"/>
-              <a:t> (e.g. no </a:t>
-            </a:r>
-            <a:r>
-              <a:rPr lang="nl-NL" dirty="0" err="1"/>
-              <a:t>standards</a:t>
-            </a:r>
-            <a:r>
-              <a:rPr lang="nl-NL" dirty="0"/>
-              <a:t> </a:t>
-            </a:r>
-            <a:r>
-              <a:rPr lang="nl-NL" dirty="0" err="1"/>
-              <a:t>for</a:t>
-            </a:r>
-            <a:r>
-              <a:rPr lang="nl-NL" dirty="0"/>
-              <a:t> </a:t>
-            </a:r>
-            <a:r>
-              <a:rPr lang="nl-NL" dirty="0" err="1"/>
-              <a:t>keys</a:t>
-            </a:r>
-            <a:r>
-              <a:rPr lang="nl-NL" dirty="0"/>
-              <a:t>)</a:t>
-            </a:r>
-          </a:p>
-          <a:p>
-            <a:pPr lvl="1"/>
-            <a:r>
-              <a:rPr lang="nl-NL" dirty="0" err="1"/>
-              <a:t>Not</a:t>
-            </a:r>
-            <a:r>
-              <a:rPr lang="nl-NL" dirty="0"/>
-              <a:t> OOP</a:t>
-            </a:r>
-          </a:p>
-          <a:p>
-            <a:pPr lvl="1"/>
-            <a:r>
-              <a:rPr lang="nl-NL" dirty="0"/>
-              <a:t>No support </a:t>
-            </a:r>
-            <a:r>
-              <a:rPr lang="nl-NL" dirty="0" err="1"/>
-              <a:t>for</a:t>
-            </a:r>
-            <a:r>
-              <a:rPr lang="nl-NL" dirty="0"/>
-              <a:t> </a:t>
-            </a:r>
-            <a:r>
-              <a:rPr lang="nl-NL" dirty="0" err="1"/>
-              <a:t>complicated</a:t>
-            </a:r>
-            <a:r>
-              <a:rPr lang="nl-NL" dirty="0"/>
-              <a:t> </a:t>
-            </a:r>
-            <a:r>
-              <a:rPr lang="nl-NL" dirty="0" err="1"/>
-              <a:t>searches</a:t>
-            </a:r>
-          </a:p>
-        </p:txBody>
-      </p:sp>
-    </p:spTree>
-    <p:extLst>
-      <p:ext uri="{BB962C8B-B14F-4D97-AF65-F5344CB8AC3E}">
-        <p14:creationId xmlns:p14="http://schemas.microsoft.com/office/powerpoint/2010/main" val="1296292502"/>
-      </p:ext>
-    </p:extLst>
-  </p:cSld>
-  <p:clrMapOvr>
-    <a:masterClrMapping/>
-  </p:clrMapOvr>
-  <p:transition spd="slow">
-    <p:push dir="u"/>
-  </p:transition>
-</p:sld>
-</file>
-
-<file path=ppt/slides/slide4.xml><?xml version="1.0" encoding="utf-8"?>
-<p:sld xmlns:a="http://schemas.openxmlformats.org/drawingml/2006/main" xmlns:r="http://schemas.openxmlformats.org/officeDocument/2006/relationships" xmlns:p="http://schemas.openxmlformats.org/presentationml/2006/main">
-  <p:cSld>
-    <p:spTree>
-      <p:nvGrpSpPr>
-        <p:cNvPr id="1" name=""/>
-        <p:cNvGrpSpPr/>
-        <p:nvPr/>
-      </p:nvGrpSpPr>
-      <p:grpSpPr>
-        <a:xfrm>
-          <a:off x="0" y="0"/>
-          <a:ext cx="0" cy="0"/>
-          <a:chOff x="0" y="0"/>
-          <a:chExt cx="0" cy="0"/>
-        </a:xfrm>
-      </p:grpSpPr>
-      <p:sp>
-        <p:nvSpPr>
-          <p:cNvPr id="2" name="Title 1">
-            <a:extLst>
-              <a:ext uri="{FF2B5EF4-FFF2-40B4-BE49-F238E27FC236}">
-                <a16:creationId xmlns:a16="http://schemas.microsoft.com/office/drawing/2014/main" id="{44BF5129-7F4D-4D0E-9212-85711F23206B}"/>
-              </a:ext>
-            </a:extLst>
-          </p:cNvPr>
-          <p:cNvSpPr>
-            <a:spLocks noGrp="1"/>
-          </p:cNvSpPr>
-          <p:nvPr>
-            <p:ph type="title"/>
-          </p:nvPr>
-        </p:nvSpPr>
-        <p:spPr/>
-        <p:txBody>
-          <a:bodyPr/>
-          <a:lstStyle/>
-          <a:p>
-            <a:r>
-              <a:rPr lang="en-US" dirty="0"/>
-              <a:t>Data Model</a:t>
-            </a:r>
-          </a:p>
-        </p:txBody>
-      </p:sp>
-      <p:sp>
-        <p:nvSpPr>
-          <p:cNvPr id="3" name="Content Placeholder 2">
-            <a:extLst>
-              <a:ext uri="{FF2B5EF4-FFF2-40B4-BE49-F238E27FC236}">
-                <a16:creationId xmlns:a16="http://schemas.microsoft.com/office/drawing/2014/main" id="{1A4CAFE1-2699-499E-B28E-8A7BF866393D}"/>
-              </a:ext>
-            </a:extLst>
-          </p:cNvPr>
-          <p:cNvSpPr>
-            <a:spLocks noGrp="1"/>
-          </p:cNvSpPr>
-          <p:nvPr>
-            <p:ph idx="1"/>
-          </p:nvPr>
-        </p:nvSpPr>
-        <p:spPr/>
-        <p:txBody>
-          <a:bodyPr/>
-          <a:lstStyle/>
-          <a:p>
-            <a:r>
-              <a:rPr lang="en-US" dirty="0"/>
-              <a:t>Key-Value Store</a:t>
-            </a:r>
-          </a:p>
-        </p:txBody>
-      </p:sp>
-      <p:graphicFrame>
-        <p:nvGraphicFramePr>
-          <p:cNvPr id="4" name="Table 3">
-            <a:extLst>
-              <a:ext uri="{FF2B5EF4-FFF2-40B4-BE49-F238E27FC236}">
-                <a16:creationId xmlns:a16="http://schemas.microsoft.com/office/drawing/2014/main" id="{9E1576C1-CD53-4FEE-BF42-A9F1E790D728}"/>
-              </a:ext>
-            </a:extLst>
-          </p:cNvPr>
-          <p:cNvGraphicFramePr>
-            <a:graphicFrameLocks noGrp="1"/>
-          </p:cNvGraphicFramePr>
-          <p:nvPr>
-            <p:extLst>
-              <p:ext uri="{D42A27DB-BD31-4B8C-83A1-F6EECF244321}">
-                <p14:modId xmlns:p14="http://schemas.microsoft.com/office/powerpoint/2010/main" val="725176477"/>
-              </p:ext>
-            </p:extLst>
-          </p:nvPr>
-        </p:nvGraphicFramePr>
-        <p:xfrm>
-          <a:off x="677334" y="2856375"/>
-          <a:ext cx="8128000" cy="2763520"/>
-        </p:xfrm>
-        <a:graphic>
-          <a:graphicData uri="http://schemas.openxmlformats.org/drawingml/2006/table">
-            <a:tbl>
-              <a:tblPr firstRow="1" bandRow="1">
-                <a:tableStyleId>{5C22544A-7EE6-4342-B048-85BDC9FD1C3A}</a:tableStyleId>
-              </a:tblPr>
-              <a:tblGrid>
-                <a:gridCol w="4064000">
-                  <a:extLst>
-                    <a:ext uri="{9D8B030D-6E8A-4147-A177-3AD203B41FA5}">
-                      <a16:colId xmlns:a16="http://schemas.microsoft.com/office/drawing/2014/main" val="2588435993"/>
-                    </a:ext>
-                  </a:extLst>
-                </a:gridCol>
-                <a:gridCol w="4064000">
-                  <a:extLst>
-                    <a:ext uri="{9D8B030D-6E8A-4147-A177-3AD203B41FA5}">
-                      <a16:colId xmlns:a16="http://schemas.microsoft.com/office/drawing/2014/main" val="2805326257"/>
-                    </a:ext>
-                  </a:extLst>
-                </a:gridCol>
-              </a:tblGrid>
-              <a:tr h="370840">
-                <a:tc>
-                  <a:txBody>
-                    <a:bodyPr/>
-                    <a:lstStyle/>
-                    <a:p>
-                      <a:r>
-                        <a:rPr lang="en-US" dirty="0"/>
-                        <a:t>Key</a:t>
-                      </a:r>
-                    </a:p>
-                  </a:txBody>
-                  <a:tcPr/>
-                </a:tc>
-                <a:tc>
-                  <a:txBody>
-                    <a:bodyPr/>
-                    <a:lstStyle/>
-                    <a:p>
-                      <a:r>
-                        <a:rPr lang="en-US" dirty="0"/>
-                        <a:t>Value</a:t>
-                      </a:r>
-                    </a:p>
-                  </a:txBody>
-                  <a:tcPr/>
-                </a:tc>
-                <a:extLst>
-                  <a:ext uri="{0D108BD9-81ED-4DB2-BD59-A6C34878D82A}">
-                    <a16:rowId xmlns:a16="http://schemas.microsoft.com/office/drawing/2014/main" val="2654511310"/>
-                  </a:ext>
-                </a:extLst>
-              </a:tr>
-              <a:tr h="370840">
-                <a:tc>
-                  <a:txBody>
-                    <a:bodyPr/>
-                    <a:lstStyle/>
-                    <a:p>
-                      <a:r>
-                        <a:rPr lang="en-US" dirty="0"/>
-                        <a:t>John</a:t>
-                      </a:r>
-                    </a:p>
-                  </a:txBody>
-                  <a:tcPr/>
-                </a:tc>
-                <a:tc>
-                  <a:txBody>
-                    <a:bodyPr/>
-                    <a:lstStyle/>
-                    <a:p>
-                      <a:r>
-                        <a:rPr lang="en-US" dirty="0">
-                          <a:hlinkClick r:id="rId3"/>
-                        </a:rPr>
-                        <a:t>johndoe@hotmail.com</a:t>
-                      </a:r>
-                      <a:endParaRPr lang="en-US" dirty="0"/>
-                    </a:p>
-                  </a:txBody>
-                  <a:tcPr/>
-                </a:tc>
-                <a:extLst>
-                  <a:ext uri="{0D108BD9-81ED-4DB2-BD59-A6C34878D82A}">
-                    <a16:rowId xmlns:a16="http://schemas.microsoft.com/office/drawing/2014/main" val="2641846362"/>
-                  </a:ext>
-                </a:extLst>
-              </a:tr>
-              <a:tr h="370840">
-                <a:tc>
-                  <a:txBody>
-                    <a:bodyPr/>
-                    <a:lstStyle/>
-                    <a:p>
-                      <a:r>
-                        <a:rPr lang="en-US" dirty="0"/>
-                        <a:t>Mammals</a:t>
-                      </a:r>
-                    </a:p>
-                  </a:txBody>
-                  <a:tcPr/>
-                </a:tc>
-                <a:tc>
-                  <a:txBody>
-                    <a:bodyPr/>
-                    <a:lstStyle/>
-                    <a:p>
-                      <a:r>
-                        <a:rPr lang="en-US" dirty="0"/>
-                        <a:t>Bear,</a:t>
-                      </a:r>
-                      <a:r>
-                        <a:rPr lang="en-US" baseline="0" dirty="0"/>
-                        <a:t> Cat, Dog, Elk, Fox</a:t>
-                      </a:r>
-                      <a:endParaRPr lang="en-US" dirty="0"/>
-                    </a:p>
-                  </a:txBody>
-                  <a:tcPr/>
-                </a:tc>
-                <a:extLst>
-                  <a:ext uri="{0D108BD9-81ED-4DB2-BD59-A6C34878D82A}">
-                    <a16:rowId xmlns:a16="http://schemas.microsoft.com/office/drawing/2014/main" val="3465832507"/>
-                  </a:ext>
-                </a:extLst>
-              </a:tr>
-              <a:tr h="370840">
-                <a:tc>
-                  <a:txBody>
-                    <a:bodyPr/>
-                    <a:lstStyle/>
-                    <a:p>
-                      <a:r>
-                        <a:rPr lang="en-US" dirty="0"/>
-                        <a:t>12984</a:t>
-                      </a:r>
-                    </a:p>
-                  </a:txBody>
-                  <a:tcPr/>
-                </a:tc>
-                <a:tc>
-                  <a:txBody>
-                    <a:bodyPr/>
-                    <a:lstStyle/>
-                    <a:p>
-                      <a:r>
-                        <a:rPr lang="en-US" dirty="0"/>
-                        <a:t>{ first:</a:t>
-                      </a:r>
-                      <a:r>
-                        <a:rPr lang="en-US" baseline="0" dirty="0"/>
-                        <a:t> “John”, last: “Doe”, age: “5”</a:t>
-                      </a:r>
-                      <a:r>
-                        <a:rPr lang="en-US" dirty="0"/>
-                        <a:t> }</a:t>
-                      </a:r>
-                    </a:p>
-                  </a:txBody>
-                  <a:tcPr/>
-                </a:tc>
-                <a:extLst>
-                  <a:ext uri="{0D108BD9-81ED-4DB2-BD59-A6C34878D82A}">
-                    <a16:rowId xmlns:a16="http://schemas.microsoft.com/office/drawing/2014/main" val="3643816431"/>
-                  </a:ext>
-                </a:extLst>
-              </a:tr>
-              <a:tr h="262941">
-                <a:tc>
-                  <a:txBody>
-                    <a:bodyPr/>
-                    <a:lstStyle/>
-                    <a:p>
-                      <a:r>
-                        <a:rPr lang="en-US" dirty="0"/>
-                        <a:t>K1</a:t>
-                      </a:r>
-                    </a:p>
-                  </a:txBody>
-                  <a:tcPr/>
-                </a:tc>
-                <a:tc>
-                  <a:txBody>
-                    <a:bodyPr/>
-                    <a:lstStyle/>
-                    <a:p>
-                      <a:r>
-                        <a:rPr lang="en-US" dirty="0"/>
-                        <a:t>AAA, 2, 01/01/2015</a:t>
-                      </a:r>
-                    </a:p>
-                  </a:txBody>
-                  <a:tcPr/>
-                </a:tc>
-                <a:extLst>
-                  <a:ext uri="{0D108BD9-81ED-4DB2-BD59-A6C34878D82A}">
-                    <a16:rowId xmlns:a16="http://schemas.microsoft.com/office/drawing/2014/main" val="2463980283"/>
-                  </a:ext>
-                </a:extLst>
-              </a:tr>
-              <a:tr h="583957">
-                <a:tc>
-                  <a:txBody>
-                    <a:bodyPr/>
-                    <a:lstStyle/>
-                    <a:p>
-                      <a:r>
-                        <a:rPr lang="en-US" dirty="0"/>
-                        <a:t>0x352CDF3F</a:t>
-                      </a:r>
-                    </a:p>
-                  </a:txBody>
-                  <a:tcPr/>
-                </a:tc>
-                <a:tc>
-                  <a:txBody>
-                    <a:bodyPr/>
-                    <a:lstStyle/>
-                    <a:p>
-                      <a:r>
-                        <a:rPr lang="en-US" dirty="0"/>
-                        <a:t>Img://cat.jpg, 120000, 01042019, john,</a:t>
-                      </a:r>
-                      <a:r>
-                        <a:rPr lang="en-US" baseline="0" dirty="0"/>
-                        <a:t> 420</a:t>
-                      </a:r>
-                      <a:endParaRPr lang="en-US" dirty="0"/>
-                    </a:p>
-                    <a:p>
-                      <a:endParaRPr lang="en-US" dirty="0"/>
-                    </a:p>
-                  </a:txBody>
-                  <a:tcPr/>
-                </a:tc>
-                <a:extLst>
-                  <a:ext uri="{0D108BD9-81ED-4DB2-BD59-A6C34878D82A}">
-                    <a16:rowId xmlns:a16="http://schemas.microsoft.com/office/drawing/2014/main" val="3321630223"/>
-                  </a:ext>
-                </a:extLst>
-              </a:tr>
-            </a:tbl>
-          </a:graphicData>
-        </a:graphic>
-      </p:graphicFrame>
-    </p:spTree>
-    <p:extLst>
-      <p:ext uri="{BB962C8B-B14F-4D97-AF65-F5344CB8AC3E}">
-        <p14:creationId xmlns:p14="http://schemas.microsoft.com/office/powerpoint/2010/main" val="3357665574"/>
-      </p:ext>
-    </p:extLst>
-  </p:cSld>
-  <p:clrMapOvr>
-    <a:masterClrMapping/>
-  </p:clrMapOvr>
-  <p:transition spd="slow">
-    <p:push dir="u"/>
-  </p:transition>
-</p:sld>
-</file>
-
-<file path=ppt/slides/slide5.xml><?xml version="1.0" encoding="utf-8"?>
-<p:sld xmlns:a="http://schemas.openxmlformats.org/drawingml/2006/main" xmlns:r="http://schemas.openxmlformats.org/officeDocument/2006/relationships" xmlns:p="http://schemas.openxmlformats.org/presentationml/2006/main">
-  <p:cSld>
-    <p:spTree>
-      <p:nvGrpSpPr>
-        <p:cNvPr id="1" name=""/>
-        <p:cNvGrpSpPr/>
-        <p:nvPr/>
-      </p:nvGrpSpPr>
-      <p:grpSpPr>
-        <a:xfrm>
-          <a:off x="0" y="0"/>
-          <a:ext cx="0" cy="0"/>
-          <a:chOff x="0" y="0"/>
-          <a:chExt cx="0" cy="0"/>
-        </a:xfrm>
-      </p:grpSpPr>
-      <p:sp>
-        <p:nvSpPr>
-          <p:cNvPr id="2" name="Title 1">
-            <a:extLst>
-              <a:ext uri="{FF2B5EF4-FFF2-40B4-BE49-F238E27FC236}">
-                <a16:creationId xmlns:a16="http://schemas.microsoft.com/office/drawing/2014/main" id="{93AD0CDA-D900-4F17-A300-087561548CB9}"/>
-              </a:ext>
-            </a:extLst>
-          </p:cNvPr>
-          <p:cNvSpPr>
-            <a:spLocks noGrp="1"/>
-          </p:cNvSpPr>
-          <p:nvPr>
-            <p:ph type="title"/>
-          </p:nvPr>
-        </p:nvSpPr>
-        <p:spPr/>
-        <p:txBody>
-          <a:bodyPr/>
-          <a:lstStyle/>
-          <a:p>
-            <a:r>
-              <a:rPr lang="en-US" dirty="0"/>
-              <a:t>Data Model</a:t>
-            </a:r>
-          </a:p>
-        </p:txBody>
-      </p:sp>
-      <p:sp>
-        <p:nvSpPr>
-          <p:cNvPr id="3" name="Content Placeholder 2">
-            <a:extLst>
-              <a:ext uri="{FF2B5EF4-FFF2-40B4-BE49-F238E27FC236}">
-                <a16:creationId xmlns:a16="http://schemas.microsoft.com/office/drawing/2014/main" id="{BEABE899-9555-4FD1-9BF7-CEDD7C8CD6D6}"/>
-              </a:ext>
-            </a:extLst>
-          </p:cNvPr>
-          <p:cNvSpPr>
-            <a:spLocks noGrp="1"/>
-          </p:cNvSpPr>
-          <p:nvPr>
-            <p:ph idx="1"/>
-          </p:nvPr>
-        </p:nvSpPr>
-        <p:spPr/>
-        <p:txBody>
-          <a:bodyPr vert="horz" lIns="91440" tIns="45720" rIns="91440" bIns="45720" rtlCol="0" anchor="t">
-            <a:normAutofit/>
-          </a:bodyPr>
-          <a:lstStyle/>
-          <a:p>
-            <a:pPr marL="0" indent="0">
-              <a:buNone/>
-            </a:pPr>
-            <a:r>
-              <a:rPr lang="en-US" dirty="0"/>
-              <a:t>Berkeley DB Specifics</a:t>
-            </a:r>
-            <a:endParaRPr lang="nl-NL" dirty="0"/>
-          </a:p>
-          <a:p>
-            <a:pPr marL="0" indent="0">
-              <a:buNone/>
-            </a:pPr>
-            <a:endParaRPr lang="en-US" dirty="0"/>
-          </a:p>
-          <a:p>
-            <a:r>
-              <a:rPr lang="en-US" dirty="0"/>
-              <a:t>Store Type</a:t>
-            </a:r>
-          </a:p>
-          <a:p>
-            <a:pPr lvl="1"/>
-            <a:r>
-              <a:rPr lang="en-US" dirty="0"/>
-              <a:t>Ordered Key-Value Store</a:t>
-            </a:r>
-          </a:p>
-          <a:p>
-            <a:r>
-              <a:rPr lang="en-US" dirty="0"/>
-              <a:t>Size</a:t>
-            </a:r>
-          </a:p>
-          <a:p>
-            <a:pPr lvl="1"/>
-            <a:r>
-              <a:rPr lang="en-US" dirty="0"/>
-              <a:t>2³² bytes key 		&lt;–&gt; 		2³² bytes value</a:t>
-            </a:r>
-          </a:p>
-          <a:p>
-            <a:r>
-              <a:rPr lang="en-US" dirty="0"/>
-              <a:t>Database type</a:t>
-            </a:r>
-          </a:p>
-          <a:p>
-            <a:pPr lvl="1"/>
-            <a:r>
-              <a:rPr lang="en-US" dirty="0"/>
-              <a:t>Embedded</a:t>
-            </a:r>
-          </a:p>
-        </p:txBody>
-      </p:sp>
-    </p:spTree>
-    <p:extLst>
-      <p:ext uri="{BB962C8B-B14F-4D97-AF65-F5344CB8AC3E}">
-        <p14:creationId xmlns:p14="http://schemas.microsoft.com/office/powerpoint/2010/main" val="577841922"/>
-      </p:ext>
-    </p:extLst>
-  </p:cSld>
-  <p:clrMapOvr>
-    <a:masterClrMapping/>
-  </p:clrMapOvr>
-  <p:transition spd="slow">
-    <p:push dir="u"/>
-  </p:transition>
-</p:sld>
-</file>
-
-<file path=ppt/slides/slide6.xml><?xml version="1.0" encoding="utf-8"?>
-<p:sld xmlns:a="http://schemas.openxmlformats.org/drawingml/2006/main" xmlns:r="http://schemas.openxmlformats.org/officeDocument/2006/relationships" xmlns:p="http://schemas.openxmlformats.org/presentationml/2006/main">
-  <p:cSld>
-    <p:spTree>
-      <p:nvGrpSpPr>
-        <p:cNvPr id="1" name=""/>
-        <p:cNvGrpSpPr/>
-        <p:nvPr/>
-      </p:nvGrpSpPr>
-      <p:grpSpPr>
-        <a:xfrm>
-          <a:off x="0" y="0"/>
-          <a:ext cx="0" cy="0"/>
-          <a:chOff x="0" y="0"/>
-          <a:chExt cx="0" cy="0"/>
-        </a:xfrm>
-      </p:grpSpPr>
-      <p:sp>
-        <p:nvSpPr>
-          <p:cNvPr id="2" name="Title 1">
-            <a:extLst>
-              <a:ext uri="{FF2B5EF4-FFF2-40B4-BE49-F238E27FC236}">
-                <a16:creationId xmlns:a16="http://schemas.microsoft.com/office/drawing/2014/main" id="{271A26CD-7ECE-40D5-B618-DCF46D551BFF}"/>
-              </a:ext>
-            </a:extLst>
-          </p:cNvPr>
-          <p:cNvSpPr>
-            <a:spLocks noGrp="1"/>
-          </p:cNvSpPr>
-          <p:nvPr>
-            <p:ph type="title"/>
-          </p:nvPr>
-        </p:nvSpPr>
-        <p:spPr/>
-        <p:txBody>
-          <a:bodyPr/>
-          <a:lstStyle/>
-          <a:p>
-            <a:r>
-              <a:rPr lang="en-US" dirty="0"/>
-              <a:t>Principles of Berkeley DB</a:t>
-            </a:r>
-          </a:p>
-        </p:txBody>
-      </p:sp>
-      <p:sp>
-        <p:nvSpPr>
-          <p:cNvPr id="3" name="Content Placeholder 2">
-            <a:extLst>
-              <a:ext uri="{FF2B5EF4-FFF2-40B4-BE49-F238E27FC236}">
-                <a16:creationId xmlns:a16="http://schemas.microsoft.com/office/drawing/2014/main" id="{5FF36FCF-EE0B-428B-A3B0-984BFA08A522}"/>
-              </a:ext>
-            </a:extLst>
-          </p:cNvPr>
-          <p:cNvSpPr>
-            <a:spLocks noGrp="1"/>
-          </p:cNvSpPr>
-          <p:nvPr>
-            <p:ph idx="1"/>
-          </p:nvPr>
-        </p:nvSpPr>
-        <p:spPr>
-          <a:xfrm>
-            <a:off x="677334" y="1933702"/>
-            <a:ext cx="8596668" cy="3178706"/>
-          </a:xfrm>
-        </p:spPr>
-        <p:txBody>
-          <a:bodyPr/>
-          <a:lstStyle/>
-          <a:p>
-            <a:r>
-              <a:rPr lang="en-US" dirty="0"/>
-              <a:t>ACID</a:t>
-            </a:r>
-          </a:p>
-          <a:p>
-            <a:r>
-              <a:rPr lang="en-US" dirty="0"/>
-              <a:t>Performance</a:t>
-            </a:r>
-          </a:p>
-          <a:p>
-            <a:r>
-              <a:rPr lang="en-US" dirty="0"/>
-              <a:t>Querying</a:t>
-            </a:r>
-          </a:p>
-          <a:p>
-            <a:r>
-              <a:rPr lang="en-US" dirty="0"/>
-              <a:t>Limitations</a:t>
-            </a:r>
-          </a:p>
-        </p:txBody>
-      </p:sp>
-      <p:pic>
-        <p:nvPicPr>
-          <p:cNvPr id="5" name="Picture 4">
-            <a:extLst>
-              <a:ext uri="{FF2B5EF4-FFF2-40B4-BE49-F238E27FC236}">
-                <a16:creationId xmlns:a16="http://schemas.microsoft.com/office/drawing/2014/main" id="{3394960A-5957-4D87-AAF1-4850F49289D8}"/>
-              </a:ext>
-            </a:extLst>
-          </p:cNvPr>
-          <p:cNvPicPr>
-            <a:picLocks noChangeAspect="1"/>
-          </p:cNvPicPr>
-          <p:nvPr/>
-        </p:nvPicPr>
-        <p:blipFill>
-          <a:blip r:embed="rId3">
-            <a:extLst>
-              <a:ext uri="{28A0092B-C50C-407E-A947-70E740481C1C}">
-                <a14:useLocalDpi xmlns:a14="http://schemas.microsoft.com/office/drawing/2010/main" val="0"/>
-              </a:ext>
-            </a:extLst>
-          </a:blip>
-          <a:stretch>
-            <a:fillRect/>
-          </a:stretch>
-        </p:blipFill>
-        <p:spPr>
-          <a:xfrm>
-            <a:off x="5270943" y="1694359"/>
-            <a:ext cx="5663757" cy="1408174"/>
-          </a:xfrm>
-          <a:prstGeom prst="rect">
-            <a:avLst/>
-          </a:prstGeom>
-        </p:spPr>
-      </p:pic>
-      <p:sp>
-        <p:nvSpPr>
-          <p:cNvPr id="6" name="Rectangle 5">
-            <a:extLst>
-              <a:ext uri="{FF2B5EF4-FFF2-40B4-BE49-F238E27FC236}">
-                <a16:creationId xmlns:a16="http://schemas.microsoft.com/office/drawing/2014/main" id="{3A540B5E-E1AC-45C2-AD8D-765C2E433DF1}"/>
-              </a:ext>
-            </a:extLst>
-          </p:cNvPr>
-          <p:cNvSpPr/>
-          <p:nvPr/>
-        </p:nvSpPr>
-        <p:spPr>
-          <a:xfrm>
-            <a:off x="5618691" y="3102533"/>
-            <a:ext cx="4563534" cy="200055"/>
-          </a:xfrm>
-          <a:prstGeom prst="rect">
-            <a:avLst/>
-          </a:prstGeom>
-        </p:spPr>
-        <p:txBody>
-          <a:bodyPr wrap="square">
-            <a:spAutoFit/>
-          </a:bodyPr>
-          <a:lstStyle/>
-          <a:p>
-            <a:r>
-              <a:rPr lang="en-US" sz="700" dirty="0">
-                <a:solidFill>
-                  <a:schemeClr val="bg1">
-                    <a:lumMod val="65000"/>
-                  </a:schemeClr>
-                </a:solidFill>
-              </a:rPr>
-              <a:t>http://highscalability.com/blog/2012/11/29/performance-data-for-leveldb-berkley-db-and-bangdb-for-rando.html</a:t>
-            </a:r>
-            <a:endParaRPr lang="en-NL" sz="700" dirty="0">
-              <a:solidFill>
-                <a:schemeClr val="bg1">
-                  <a:lumMod val="65000"/>
-                </a:schemeClr>
-              </a:solidFill>
-            </a:endParaRPr>
-          </a:p>
-        </p:txBody>
-      </p:sp>
-    </p:spTree>
-    <p:extLst>
-      <p:ext uri="{BB962C8B-B14F-4D97-AF65-F5344CB8AC3E}">
-        <p14:creationId xmlns:p14="http://schemas.microsoft.com/office/powerpoint/2010/main" val="1007026661"/>
-      </p:ext>
-    </p:extLst>
-  </p:cSld>
-  <p:clrMapOvr>
-    <a:masterClrMapping/>
-  </p:clrMapOvr>
-  <p:transition spd="slow">
-    <p:push dir="u"/>
-  </p:transition>
-</p:sld>
-</file>
-
-<file path=ppt/slides/slide7.xml><?xml version="1.0" encoding="utf-8"?>
-<p:sld xmlns:a="http://schemas.openxmlformats.org/drawingml/2006/main" xmlns:r="http://schemas.openxmlformats.org/officeDocument/2006/relationships" xmlns:p="http://schemas.openxmlformats.org/presentationml/2006/main">
-  <p:cSld>
-    <p:spTree>
-      <p:nvGrpSpPr>
-        <p:cNvPr id="1" name=""/>
-        <p:cNvGrpSpPr/>
-        <p:nvPr/>
-      </p:nvGrpSpPr>
-      <p:grpSpPr>
-        <a:xfrm>
-          <a:off x="0" y="0"/>
-          <a:ext cx="0" cy="0"/>
-          <a:chOff x="0" y="0"/>
-          <a:chExt cx="0" cy="0"/>
-        </a:xfrm>
-      </p:grpSpPr>
-      <p:sp>
-        <p:nvSpPr>
-          <p:cNvPr id="2" name="Titel 1">
-            <a:extLst>
-              <a:ext uri="{FF2B5EF4-FFF2-40B4-BE49-F238E27FC236}">
-                <a16:creationId xmlns:a16="http://schemas.microsoft.com/office/drawing/2014/main" id="{4C974D38-A875-4FE0-A3BF-9DC02FF076D9}"/>
-              </a:ext>
-            </a:extLst>
-          </p:cNvPr>
-          <p:cNvSpPr>
-            <a:spLocks noGrp="1"/>
-          </p:cNvSpPr>
-          <p:nvPr>
-            <p:ph type="title"/>
-          </p:nvPr>
-        </p:nvSpPr>
-        <p:spPr/>
-        <p:txBody>
-          <a:bodyPr/>
-          <a:lstStyle/>
-          <a:p>
-            <a:r>
-              <a:rPr lang="en-US" dirty="0"/>
-              <a:t>Principles</a:t>
-            </a:r>
-            <a:r>
-              <a:rPr lang="nl-NL" dirty="0"/>
-              <a:t> of Berkeley DB</a:t>
-            </a:r>
-          </a:p>
-        </p:txBody>
-      </p:sp>
-      <p:sp>
-        <p:nvSpPr>
-          <p:cNvPr id="3" name="Tijdelijke aanduiding voor inhoud 2">
-            <a:extLst>
-              <a:ext uri="{FF2B5EF4-FFF2-40B4-BE49-F238E27FC236}">
-                <a16:creationId xmlns:a16="http://schemas.microsoft.com/office/drawing/2014/main" id="{EFF8583D-63B2-4788-8805-671F0FFA27E3}"/>
-              </a:ext>
-            </a:extLst>
-          </p:cNvPr>
-          <p:cNvSpPr>
-            <a:spLocks noGrp="1"/>
-          </p:cNvSpPr>
-          <p:nvPr>
-            <p:ph idx="1"/>
-          </p:nvPr>
-        </p:nvSpPr>
-        <p:spPr/>
-        <p:txBody>
-          <a:bodyPr vert="horz" lIns="91440" tIns="45720" rIns="91440" bIns="45720" rtlCol="0" anchor="t">
-            <a:normAutofit/>
-          </a:bodyPr>
-          <a:lstStyle/>
-          <a:p>
-            <a:pPr marL="0" indent="0">
-              <a:buNone/>
-            </a:pPr>
-            <a:r>
-              <a:rPr lang="nl-NL" dirty="0"/>
-              <a:t>ACID</a:t>
-            </a:r>
-          </a:p>
-          <a:p>
-            <a:r>
-              <a:rPr lang="nl-NL" dirty="0" err="1"/>
-              <a:t>Atomicity</a:t>
-            </a:r>
-          </a:p>
-          <a:p>
-            <a:r>
-              <a:rPr lang="nl-NL" dirty="0" err="1"/>
-              <a:t>Consistency</a:t>
-            </a:r>
-          </a:p>
-          <a:p>
-            <a:r>
-              <a:rPr lang="nl-NL" dirty="0" err="1"/>
-              <a:t>Integrity</a:t>
-            </a:r>
-          </a:p>
-          <a:p>
-            <a:r>
-              <a:rPr lang="nl-NL" dirty="0" err="1"/>
-              <a:t>Durability</a:t>
-            </a:r>
-          </a:p>
-        </p:txBody>
-      </p:sp>
-    </p:spTree>
-    <p:extLst>
-      <p:ext uri="{BB962C8B-B14F-4D97-AF65-F5344CB8AC3E}">
-        <p14:creationId xmlns:p14="http://schemas.microsoft.com/office/powerpoint/2010/main" val="3394059389"/>
-      </p:ext>
-    </p:extLst>
-  </p:cSld>
-  <p:clrMapOvr>
-    <a:masterClrMapping/>
-  </p:clrMapOvr>
-  <p:transition spd="slow">
-    <p:push dir="u"/>
-  </p:transition>
-</p:sld>
-</file>
-
-<file path=ppt/slides/slide8.xml><?xml version="1.0" encoding="utf-8"?>
+<file path=ppt/slides/slide10.xml><?xml version="1.0" encoding="utf-8"?>
 <p:sld xmlns:a="http://schemas.openxmlformats.org/drawingml/2006/main" xmlns:r="http://schemas.openxmlformats.org/officeDocument/2006/relationships" xmlns:p="http://schemas.openxmlformats.org/presentationml/2006/main">
   <p:cSld>
     <p:spTree>
@@ -8476,7 +7354,7 @@
 </p:sld>
 </file>
 
-<file path=ppt/slides/slide9.xml><?xml version="1.0" encoding="utf-8"?>
+<file path=ppt/slides/slide11.xml><?xml version="1.0" encoding="utf-8"?>
 <p:sld xmlns:a="http://schemas.openxmlformats.org/drawingml/2006/main" xmlns:r="http://schemas.openxmlformats.org/officeDocument/2006/relationships" xmlns:p="http://schemas.openxmlformats.org/presentationml/2006/main">
   <p:cSld>
     <p:bg>
@@ -9724,6 +8602,1434 @@
 </p:sld>
 </file>
 
+<file path=ppt/slides/slide2.xml><?xml version="1.0" encoding="utf-8"?>
+<p:sld xmlns:a="http://schemas.openxmlformats.org/drawingml/2006/main" xmlns:r="http://schemas.openxmlformats.org/officeDocument/2006/relationships" xmlns:p="http://schemas.openxmlformats.org/presentationml/2006/main">
+  <p:cSld>
+    <p:bg>
+      <p:bgPr>
+        <a:solidFill>
+          <a:schemeClr val="bg1"/>
+        </a:solidFill>
+        <a:effectLst/>
+      </p:bgPr>
+    </p:bg>
+    <p:spTree>
+      <p:nvGrpSpPr>
+        <p:cNvPr id="1" name=""/>
+        <p:cNvGrpSpPr/>
+        <p:nvPr/>
+      </p:nvGrpSpPr>
+      <p:grpSpPr>
+        <a:xfrm>
+          <a:off x="0" y="0"/>
+          <a:ext cx="0" cy="0"/>
+          <a:chOff x="0" y="0"/>
+          <a:chExt cx="0" cy="0"/>
+        </a:xfrm>
+      </p:grpSpPr>
+      <p:cxnSp>
+        <p:nvCxnSpPr>
+          <p:cNvPr id="8" name="Straight Connector 7">
+            <a:extLst>
+              <a:ext uri="{FF2B5EF4-FFF2-40B4-BE49-F238E27FC236}">
+                <a16:creationId xmlns:a16="http://schemas.microsoft.com/office/drawing/2014/main" id="{0B5F7E3B-C5F1-40E0-A491-558BAFBC1127}"/>
+              </a:ext>
+              <a:ext uri="{C183D7F6-B498-43B3-948B-1728B52AA6E4}">
+                <adec:decorative xmlns:adec="http://schemas.microsoft.com/office/drawing/2017/decorative" val="1"/>
+              </a:ext>
+            </a:extLst>
+          </p:cNvPr>
+          <p:cNvCxnSpPr>
+            <a:cxnSpLocks noGrp="1" noRot="1" noChangeAspect="1" noMove="1" noResize="1" noEditPoints="1" noAdjustHandles="1" noChangeArrowheads="1" noChangeShapeType="1"/>
+          </p:cNvCxnSpPr>
+          <p:nvPr>
+            <p:extLst>
+              <p:ext uri="{386F3935-93C4-4BCD-93E2-E3B085C9AB24}">
+                <p16:designElem xmlns:p16="http://schemas.microsoft.com/office/powerpoint/2015/main" val="1"/>
+              </p:ext>
+            </p:extLst>
+          </p:nvPr>
+        </p:nvCxnSpPr>
+        <p:spPr>
+          <a:xfrm>
+            <a:off x="4241804" y="1460500"/>
+            <a:ext cx="0" cy="3937000"/>
+          </a:xfrm>
+          <a:prstGeom prst="line">
+            <a:avLst/>
+          </a:prstGeom>
+        </p:spPr>
+        <p:style>
+          <a:lnRef idx="1">
+            <a:schemeClr val="accent1"/>
+          </a:lnRef>
+          <a:fillRef idx="0">
+            <a:schemeClr val="accent1"/>
+          </a:fillRef>
+          <a:effectRef idx="0">
+            <a:schemeClr val="accent1"/>
+          </a:effectRef>
+          <a:fontRef idx="minor">
+            <a:schemeClr val="tx1"/>
+          </a:fontRef>
+        </p:style>
+      </p:cxnSp>
+      <p:sp>
+        <p:nvSpPr>
+          <p:cNvPr id="2" name="Title 1">
+            <a:extLst>
+              <a:ext uri="{FF2B5EF4-FFF2-40B4-BE49-F238E27FC236}">
+                <a16:creationId xmlns:a16="http://schemas.microsoft.com/office/drawing/2014/main" id="{560179A6-9F4F-4FA2-806B-415F004AAFF9}"/>
+              </a:ext>
+            </a:extLst>
+          </p:cNvPr>
+          <p:cNvSpPr>
+            <a:spLocks noGrp="1"/>
+          </p:cNvSpPr>
+          <p:nvPr>
+            <p:ph type="title"/>
+          </p:nvPr>
+        </p:nvSpPr>
+        <p:spPr>
+          <a:xfrm>
+            <a:off x="643467" y="816638"/>
+            <a:ext cx="3367359" cy="5224724"/>
+          </a:xfrm>
+        </p:spPr>
+        <p:txBody>
+          <a:bodyPr anchor="ctr">
+            <a:normAutofit/>
+          </a:bodyPr>
+          <a:lstStyle/>
+          <a:p>
+            <a:r>
+              <a:rPr lang="en-US" dirty="0"/>
+              <a:t>Introduction</a:t>
+            </a:r>
+          </a:p>
+        </p:txBody>
+      </p:sp>
+      <p:sp>
+        <p:nvSpPr>
+          <p:cNvPr id="3" name="Content Placeholder 2">
+            <a:extLst>
+              <a:ext uri="{FF2B5EF4-FFF2-40B4-BE49-F238E27FC236}">
+                <a16:creationId xmlns:a16="http://schemas.microsoft.com/office/drawing/2014/main" id="{A0E81F03-58BC-4FC3-9CC8-FB84512531CA}"/>
+              </a:ext>
+            </a:extLst>
+          </p:cNvPr>
+          <p:cNvSpPr>
+            <a:spLocks noGrp="1"/>
+          </p:cNvSpPr>
+          <p:nvPr>
+            <p:ph idx="1"/>
+          </p:nvPr>
+        </p:nvSpPr>
+        <p:spPr>
+          <a:xfrm>
+            <a:off x="4654295" y="816638"/>
+            <a:ext cx="4619706" cy="5224724"/>
+          </a:xfrm>
+        </p:spPr>
+        <p:txBody>
+          <a:bodyPr anchor="ctr">
+            <a:normAutofit/>
+          </a:bodyPr>
+          <a:lstStyle/>
+          <a:p>
+            <a:r>
+              <a:rPr lang="en-US" dirty="0"/>
+              <a:t>Data Model</a:t>
+            </a:r>
+          </a:p>
+          <a:p>
+            <a:r>
+              <a:rPr lang="en-US" dirty="0"/>
+              <a:t>Principles of Berkeley DB</a:t>
+            </a:r>
+          </a:p>
+          <a:p>
+            <a:r>
+              <a:rPr lang="en-US" dirty="0"/>
+              <a:t>Economics</a:t>
+            </a:r>
+          </a:p>
+          <a:p>
+            <a:r>
+              <a:rPr lang="en-US" dirty="0"/>
+              <a:t>Demo</a:t>
+            </a:r>
+          </a:p>
+        </p:txBody>
+      </p:sp>
+    </p:spTree>
+    <p:extLst>
+      <p:ext uri="{BB962C8B-B14F-4D97-AF65-F5344CB8AC3E}">
+        <p14:creationId xmlns:p14="http://schemas.microsoft.com/office/powerpoint/2010/main" val="1986045945"/>
+      </p:ext>
+    </p:extLst>
+  </p:cSld>
+  <p:clrMapOvr>
+    <a:masterClrMapping/>
+  </p:clrMapOvr>
+  <p:transition spd="slow">
+    <p:push dir="u"/>
+  </p:transition>
+</p:sld>
+</file>
+
+<file path=ppt/slides/slide3.xml><?xml version="1.0" encoding="utf-8"?>
+<p:sld xmlns:a="http://schemas.openxmlformats.org/drawingml/2006/main" xmlns:r="http://schemas.openxmlformats.org/officeDocument/2006/relationships" xmlns:p="http://schemas.openxmlformats.org/presentationml/2006/main">
+  <p:cSld>
+    <p:spTree>
+      <p:nvGrpSpPr>
+        <p:cNvPr id="1" name=""/>
+        <p:cNvGrpSpPr/>
+        <p:nvPr/>
+      </p:nvGrpSpPr>
+      <p:grpSpPr>
+        <a:xfrm>
+          <a:off x="0" y="0"/>
+          <a:ext cx="0" cy="0"/>
+          <a:chOff x="0" y="0"/>
+          <a:chExt cx="0" cy="0"/>
+        </a:xfrm>
+      </p:grpSpPr>
+      <p:sp>
+        <p:nvSpPr>
+          <p:cNvPr id="2" name="Titel 1">
+            <a:extLst>
+              <a:ext uri="{FF2B5EF4-FFF2-40B4-BE49-F238E27FC236}">
+                <a16:creationId xmlns:a16="http://schemas.microsoft.com/office/drawing/2014/main" id="{52DCDA6A-EC0A-43DC-B8A2-CE81989E4364}"/>
+              </a:ext>
+            </a:extLst>
+          </p:cNvPr>
+          <p:cNvSpPr>
+            <a:spLocks noGrp="1"/>
+          </p:cNvSpPr>
+          <p:nvPr>
+            <p:ph type="title"/>
+          </p:nvPr>
+        </p:nvSpPr>
+        <p:spPr/>
+        <p:txBody>
+          <a:bodyPr/>
+          <a:lstStyle/>
+          <a:p>
+            <a:r>
+              <a:rPr lang="nl-NL" dirty="0"/>
+              <a:t>Data Model</a:t>
+            </a:r>
+          </a:p>
+        </p:txBody>
+      </p:sp>
+      <p:sp>
+        <p:nvSpPr>
+          <p:cNvPr id="3" name="Tijdelijke aanduiding voor inhoud 2">
+            <a:extLst>
+              <a:ext uri="{FF2B5EF4-FFF2-40B4-BE49-F238E27FC236}">
+                <a16:creationId xmlns:a16="http://schemas.microsoft.com/office/drawing/2014/main" id="{DF18D24E-576B-4C15-816F-FA9A0FC14902}"/>
+              </a:ext>
+            </a:extLst>
+          </p:cNvPr>
+          <p:cNvSpPr>
+            <a:spLocks noGrp="1"/>
+          </p:cNvSpPr>
+          <p:nvPr>
+            <p:ph idx="1"/>
+          </p:nvPr>
+        </p:nvSpPr>
+        <p:spPr/>
+        <p:txBody>
+          <a:bodyPr vert="horz" lIns="91440" tIns="45720" rIns="91440" bIns="45720" rtlCol="0" anchor="t">
+            <a:normAutofit/>
+          </a:bodyPr>
+          <a:lstStyle/>
+          <a:p>
+            <a:r>
+              <a:rPr lang="nl-NL" dirty="0" err="1"/>
+              <a:t>Key</a:t>
+            </a:r>
+            <a:r>
+              <a:rPr lang="nl-NL" dirty="0"/>
+              <a:t>-Value Store</a:t>
+            </a:r>
+          </a:p>
+          <a:p>
+            <a:r>
+              <a:rPr lang="nl-NL" dirty="0"/>
+              <a:t>Pros:</a:t>
+            </a:r>
+          </a:p>
+          <a:p>
+            <a:pPr lvl="1"/>
+            <a:r>
+              <a:rPr lang="nl-NL" dirty="0" err="1"/>
+              <a:t>Simplistic</a:t>
+            </a:r>
+          </a:p>
+          <a:p>
+            <a:pPr lvl="1"/>
+            <a:r>
+              <a:rPr lang="nl-NL" dirty="0" err="1"/>
+              <a:t>Flexible</a:t>
+            </a:r>
+          </a:p>
+          <a:p>
+            <a:pPr lvl="1"/>
+            <a:r>
+              <a:rPr lang="nl-NL" dirty="0" err="1"/>
+              <a:t>Scalable</a:t>
+            </a:r>
+          </a:p>
+          <a:p>
+            <a:pPr lvl="1"/>
+            <a:r>
+              <a:rPr lang="nl-NL" dirty="0"/>
+              <a:t>Performance</a:t>
+            </a:r>
+          </a:p>
+          <a:p>
+            <a:r>
+              <a:rPr lang="nl-NL" dirty="0" err="1"/>
+              <a:t>Cons</a:t>
+            </a:r>
+            <a:r>
+              <a:rPr lang="nl-NL" dirty="0"/>
+              <a:t>:</a:t>
+            </a:r>
+          </a:p>
+          <a:p>
+            <a:pPr lvl="1"/>
+            <a:r>
+              <a:rPr lang="nl-NL" dirty="0" err="1"/>
+              <a:t>Lack</a:t>
+            </a:r>
+            <a:r>
+              <a:rPr lang="nl-NL" dirty="0"/>
+              <a:t> of </a:t>
+            </a:r>
+            <a:r>
+              <a:rPr lang="nl-NL" dirty="0" err="1"/>
+              <a:t>Standardization</a:t>
+            </a:r>
+            <a:r>
+              <a:rPr lang="nl-NL" dirty="0"/>
+              <a:t> (e.g. no </a:t>
+            </a:r>
+            <a:r>
+              <a:rPr lang="nl-NL" dirty="0" err="1"/>
+              <a:t>standards</a:t>
+            </a:r>
+            <a:r>
+              <a:rPr lang="nl-NL" dirty="0"/>
+              <a:t> </a:t>
+            </a:r>
+            <a:r>
+              <a:rPr lang="nl-NL" dirty="0" err="1"/>
+              <a:t>for</a:t>
+            </a:r>
+            <a:r>
+              <a:rPr lang="nl-NL" dirty="0"/>
+              <a:t> </a:t>
+            </a:r>
+            <a:r>
+              <a:rPr lang="nl-NL" dirty="0" err="1"/>
+              <a:t>keys</a:t>
+            </a:r>
+            <a:r>
+              <a:rPr lang="nl-NL" dirty="0"/>
+              <a:t>)</a:t>
+            </a:r>
+          </a:p>
+          <a:p>
+            <a:pPr lvl="1"/>
+            <a:r>
+              <a:rPr lang="nl-NL" dirty="0" err="1"/>
+              <a:t>Not</a:t>
+            </a:r>
+            <a:r>
+              <a:rPr lang="nl-NL" dirty="0"/>
+              <a:t> OOP</a:t>
+            </a:r>
+          </a:p>
+          <a:p>
+            <a:pPr lvl="1"/>
+            <a:r>
+              <a:rPr lang="nl-NL" dirty="0"/>
+              <a:t>No support </a:t>
+            </a:r>
+            <a:r>
+              <a:rPr lang="nl-NL" dirty="0" err="1"/>
+              <a:t>for</a:t>
+            </a:r>
+            <a:r>
+              <a:rPr lang="nl-NL" dirty="0"/>
+              <a:t> </a:t>
+            </a:r>
+            <a:r>
+              <a:rPr lang="nl-NL" dirty="0" err="1"/>
+              <a:t>complicated</a:t>
+            </a:r>
+            <a:r>
+              <a:rPr lang="nl-NL" dirty="0"/>
+              <a:t> </a:t>
+            </a:r>
+            <a:r>
+              <a:rPr lang="nl-NL" dirty="0" err="1"/>
+              <a:t>searches</a:t>
+            </a:r>
+          </a:p>
+        </p:txBody>
+      </p:sp>
+    </p:spTree>
+    <p:extLst>
+      <p:ext uri="{BB962C8B-B14F-4D97-AF65-F5344CB8AC3E}">
+        <p14:creationId xmlns:p14="http://schemas.microsoft.com/office/powerpoint/2010/main" val="1296292502"/>
+      </p:ext>
+    </p:extLst>
+  </p:cSld>
+  <p:clrMapOvr>
+    <a:masterClrMapping/>
+  </p:clrMapOvr>
+  <p:transition spd="slow">
+    <p:push dir="u"/>
+  </p:transition>
+</p:sld>
+</file>
+
+<file path=ppt/slides/slide4.xml><?xml version="1.0" encoding="utf-8"?>
+<p:sld xmlns:a="http://schemas.openxmlformats.org/drawingml/2006/main" xmlns:r="http://schemas.openxmlformats.org/officeDocument/2006/relationships" xmlns:p="http://schemas.openxmlformats.org/presentationml/2006/main">
+  <p:cSld>
+    <p:spTree>
+      <p:nvGrpSpPr>
+        <p:cNvPr id="1" name=""/>
+        <p:cNvGrpSpPr/>
+        <p:nvPr/>
+      </p:nvGrpSpPr>
+      <p:grpSpPr>
+        <a:xfrm>
+          <a:off x="0" y="0"/>
+          <a:ext cx="0" cy="0"/>
+          <a:chOff x="0" y="0"/>
+          <a:chExt cx="0" cy="0"/>
+        </a:xfrm>
+      </p:grpSpPr>
+      <p:sp>
+        <p:nvSpPr>
+          <p:cNvPr id="2" name="Title 1">
+            <a:extLst>
+              <a:ext uri="{FF2B5EF4-FFF2-40B4-BE49-F238E27FC236}">
+                <a16:creationId xmlns:a16="http://schemas.microsoft.com/office/drawing/2014/main" id="{44BF5129-7F4D-4D0E-9212-85711F23206B}"/>
+              </a:ext>
+            </a:extLst>
+          </p:cNvPr>
+          <p:cNvSpPr>
+            <a:spLocks noGrp="1"/>
+          </p:cNvSpPr>
+          <p:nvPr>
+            <p:ph type="title"/>
+          </p:nvPr>
+        </p:nvSpPr>
+        <p:spPr/>
+        <p:txBody>
+          <a:bodyPr/>
+          <a:lstStyle/>
+          <a:p>
+            <a:r>
+              <a:rPr lang="en-US" dirty="0"/>
+              <a:t>Data Model</a:t>
+            </a:r>
+          </a:p>
+        </p:txBody>
+      </p:sp>
+      <p:sp>
+        <p:nvSpPr>
+          <p:cNvPr id="3" name="Content Placeholder 2">
+            <a:extLst>
+              <a:ext uri="{FF2B5EF4-FFF2-40B4-BE49-F238E27FC236}">
+                <a16:creationId xmlns:a16="http://schemas.microsoft.com/office/drawing/2014/main" id="{1A4CAFE1-2699-499E-B28E-8A7BF866393D}"/>
+              </a:ext>
+            </a:extLst>
+          </p:cNvPr>
+          <p:cNvSpPr>
+            <a:spLocks noGrp="1"/>
+          </p:cNvSpPr>
+          <p:nvPr>
+            <p:ph idx="1"/>
+          </p:nvPr>
+        </p:nvSpPr>
+        <p:spPr/>
+        <p:txBody>
+          <a:bodyPr/>
+          <a:lstStyle/>
+          <a:p>
+            <a:r>
+              <a:rPr lang="en-US" dirty="0"/>
+              <a:t>Key-Value Store</a:t>
+            </a:r>
+          </a:p>
+        </p:txBody>
+      </p:sp>
+      <p:graphicFrame>
+        <p:nvGraphicFramePr>
+          <p:cNvPr id="4" name="Table 3">
+            <a:extLst>
+              <a:ext uri="{FF2B5EF4-FFF2-40B4-BE49-F238E27FC236}">
+                <a16:creationId xmlns:a16="http://schemas.microsoft.com/office/drawing/2014/main" id="{9E1576C1-CD53-4FEE-BF42-A9F1E790D728}"/>
+              </a:ext>
+            </a:extLst>
+          </p:cNvPr>
+          <p:cNvGraphicFramePr>
+            <a:graphicFrameLocks noGrp="1"/>
+          </p:cNvGraphicFramePr>
+          <p:nvPr>
+            <p:extLst>
+              <p:ext uri="{D42A27DB-BD31-4B8C-83A1-F6EECF244321}">
+                <p14:modId xmlns:p14="http://schemas.microsoft.com/office/powerpoint/2010/main" val="725176477"/>
+              </p:ext>
+            </p:extLst>
+          </p:nvPr>
+        </p:nvGraphicFramePr>
+        <p:xfrm>
+          <a:off x="677334" y="2856375"/>
+          <a:ext cx="8128000" cy="2763520"/>
+        </p:xfrm>
+        <a:graphic>
+          <a:graphicData uri="http://schemas.openxmlformats.org/drawingml/2006/table">
+            <a:tbl>
+              <a:tblPr firstRow="1" bandRow="1">
+                <a:tableStyleId>{5C22544A-7EE6-4342-B048-85BDC9FD1C3A}</a:tableStyleId>
+              </a:tblPr>
+              <a:tblGrid>
+                <a:gridCol w="4064000">
+                  <a:extLst>
+                    <a:ext uri="{9D8B030D-6E8A-4147-A177-3AD203B41FA5}">
+                      <a16:colId xmlns:a16="http://schemas.microsoft.com/office/drawing/2014/main" val="2588435993"/>
+                    </a:ext>
+                  </a:extLst>
+                </a:gridCol>
+                <a:gridCol w="4064000">
+                  <a:extLst>
+                    <a:ext uri="{9D8B030D-6E8A-4147-A177-3AD203B41FA5}">
+                      <a16:colId xmlns:a16="http://schemas.microsoft.com/office/drawing/2014/main" val="2805326257"/>
+                    </a:ext>
+                  </a:extLst>
+                </a:gridCol>
+              </a:tblGrid>
+              <a:tr h="370840">
+                <a:tc>
+                  <a:txBody>
+                    <a:bodyPr/>
+                    <a:lstStyle/>
+                    <a:p>
+                      <a:r>
+                        <a:rPr lang="en-US" dirty="0"/>
+                        <a:t>Key</a:t>
+                      </a:r>
+                    </a:p>
+                  </a:txBody>
+                  <a:tcPr/>
+                </a:tc>
+                <a:tc>
+                  <a:txBody>
+                    <a:bodyPr/>
+                    <a:lstStyle/>
+                    <a:p>
+                      <a:r>
+                        <a:rPr lang="en-US" dirty="0"/>
+                        <a:t>Value</a:t>
+                      </a:r>
+                    </a:p>
+                  </a:txBody>
+                  <a:tcPr/>
+                </a:tc>
+                <a:extLst>
+                  <a:ext uri="{0D108BD9-81ED-4DB2-BD59-A6C34878D82A}">
+                    <a16:rowId xmlns:a16="http://schemas.microsoft.com/office/drawing/2014/main" val="2654511310"/>
+                  </a:ext>
+                </a:extLst>
+              </a:tr>
+              <a:tr h="370840">
+                <a:tc>
+                  <a:txBody>
+                    <a:bodyPr/>
+                    <a:lstStyle/>
+                    <a:p>
+                      <a:r>
+                        <a:rPr lang="en-US" dirty="0"/>
+                        <a:t>John</a:t>
+                      </a:r>
+                    </a:p>
+                  </a:txBody>
+                  <a:tcPr/>
+                </a:tc>
+                <a:tc>
+                  <a:txBody>
+                    <a:bodyPr/>
+                    <a:lstStyle/>
+                    <a:p>
+                      <a:r>
+                        <a:rPr lang="en-US" dirty="0">
+                          <a:hlinkClick r:id="rId3"/>
+                        </a:rPr>
+                        <a:t>johndoe@hotmail.com</a:t>
+                      </a:r>
+                      <a:endParaRPr lang="en-US" dirty="0"/>
+                    </a:p>
+                  </a:txBody>
+                  <a:tcPr/>
+                </a:tc>
+                <a:extLst>
+                  <a:ext uri="{0D108BD9-81ED-4DB2-BD59-A6C34878D82A}">
+                    <a16:rowId xmlns:a16="http://schemas.microsoft.com/office/drawing/2014/main" val="2641846362"/>
+                  </a:ext>
+                </a:extLst>
+              </a:tr>
+              <a:tr h="370840">
+                <a:tc>
+                  <a:txBody>
+                    <a:bodyPr/>
+                    <a:lstStyle/>
+                    <a:p>
+                      <a:r>
+                        <a:rPr lang="en-US" dirty="0"/>
+                        <a:t>Mammals</a:t>
+                      </a:r>
+                    </a:p>
+                  </a:txBody>
+                  <a:tcPr/>
+                </a:tc>
+                <a:tc>
+                  <a:txBody>
+                    <a:bodyPr/>
+                    <a:lstStyle/>
+                    <a:p>
+                      <a:r>
+                        <a:rPr lang="en-US" dirty="0"/>
+                        <a:t>Bear,</a:t>
+                      </a:r>
+                      <a:r>
+                        <a:rPr lang="en-US" baseline="0" dirty="0"/>
+                        <a:t> Cat, Dog, Elk, Fox</a:t>
+                      </a:r>
+                      <a:endParaRPr lang="en-US" dirty="0"/>
+                    </a:p>
+                  </a:txBody>
+                  <a:tcPr/>
+                </a:tc>
+                <a:extLst>
+                  <a:ext uri="{0D108BD9-81ED-4DB2-BD59-A6C34878D82A}">
+                    <a16:rowId xmlns:a16="http://schemas.microsoft.com/office/drawing/2014/main" val="3465832507"/>
+                  </a:ext>
+                </a:extLst>
+              </a:tr>
+              <a:tr h="370840">
+                <a:tc>
+                  <a:txBody>
+                    <a:bodyPr/>
+                    <a:lstStyle/>
+                    <a:p>
+                      <a:r>
+                        <a:rPr lang="en-US" dirty="0"/>
+                        <a:t>12984</a:t>
+                      </a:r>
+                    </a:p>
+                  </a:txBody>
+                  <a:tcPr/>
+                </a:tc>
+                <a:tc>
+                  <a:txBody>
+                    <a:bodyPr/>
+                    <a:lstStyle/>
+                    <a:p>
+                      <a:r>
+                        <a:rPr lang="en-US" dirty="0"/>
+                        <a:t>{ first:</a:t>
+                      </a:r>
+                      <a:r>
+                        <a:rPr lang="en-US" baseline="0" dirty="0"/>
+                        <a:t> “John”, last: “Doe”, age: “5”</a:t>
+                      </a:r>
+                      <a:r>
+                        <a:rPr lang="en-US" dirty="0"/>
+                        <a:t> }</a:t>
+                      </a:r>
+                    </a:p>
+                  </a:txBody>
+                  <a:tcPr/>
+                </a:tc>
+                <a:extLst>
+                  <a:ext uri="{0D108BD9-81ED-4DB2-BD59-A6C34878D82A}">
+                    <a16:rowId xmlns:a16="http://schemas.microsoft.com/office/drawing/2014/main" val="3643816431"/>
+                  </a:ext>
+                </a:extLst>
+              </a:tr>
+              <a:tr h="262941">
+                <a:tc>
+                  <a:txBody>
+                    <a:bodyPr/>
+                    <a:lstStyle/>
+                    <a:p>
+                      <a:r>
+                        <a:rPr lang="en-US" dirty="0"/>
+                        <a:t>K1</a:t>
+                      </a:r>
+                    </a:p>
+                  </a:txBody>
+                  <a:tcPr/>
+                </a:tc>
+                <a:tc>
+                  <a:txBody>
+                    <a:bodyPr/>
+                    <a:lstStyle/>
+                    <a:p>
+                      <a:r>
+                        <a:rPr lang="en-US" dirty="0"/>
+                        <a:t>AAA, 2, 01/01/2015</a:t>
+                      </a:r>
+                    </a:p>
+                  </a:txBody>
+                  <a:tcPr/>
+                </a:tc>
+                <a:extLst>
+                  <a:ext uri="{0D108BD9-81ED-4DB2-BD59-A6C34878D82A}">
+                    <a16:rowId xmlns:a16="http://schemas.microsoft.com/office/drawing/2014/main" val="2463980283"/>
+                  </a:ext>
+                </a:extLst>
+              </a:tr>
+              <a:tr h="583957">
+                <a:tc>
+                  <a:txBody>
+                    <a:bodyPr/>
+                    <a:lstStyle/>
+                    <a:p>
+                      <a:r>
+                        <a:rPr lang="en-US" dirty="0"/>
+                        <a:t>0x352CDF3F</a:t>
+                      </a:r>
+                    </a:p>
+                  </a:txBody>
+                  <a:tcPr/>
+                </a:tc>
+                <a:tc>
+                  <a:txBody>
+                    <a:bodyPr/>
+                    <a:lstStyle/>
+                    <a:p>
+                      <a:r>
+                        <a:rPr lang="en-US" dirty="0"/>
+                        <a:t>Img://cat.jpg, 120000, 01042019, john,</a:t>
+                      </a:r>
+                      <a:r>
+                        <a:rPr lang="en-US" baseline="0" dirty="0"/>
+                        <a:t> 420</a:t>
+                      </a:r>
+                      <a:endParaRPr lang="en-US" dirty="0"/>
+                    </a:p>
+                    <a:p>
+                      <a:endParaRPr lang="en-US" dirty="0"/>
+                    </a:p>
+                  </a:txBody>
+                  <a:tcPr/>
+                </a:tc>
+                <a:extLst>
+                  <a:ext uri="{0D108BD9-81ED-4DB2-BD59-A6C34878D82A}">
+                    <a16:rowId xmlns:a16="http://schemas.microsoft.com/office/drawing/2014/main" val="3321630223"/>
+                  </a:ext>
+                </a:extLst>
+              </a:tr>
+            </a:tbl>
+          </a:graphicData>
+        </a:graphic>
+      </p:graphicFrame>
+    </p:spTree>
+    <p:extLst>
+      <p:ext uri="{BB962C8B-B14F-4D97-AF65-F5344CB8AC3E}">
+        <p14:creationId xmlns:p14="http://schemas.microsoft.com/office/powerpoint/2010/main" val="3357665574"/>
+      </p:ext>
+    </p:extLst>
+  </p:cSld>
+  <p:clrMapOvr>
+    <a:masterClrMapping/>
+  </p:clrMapOvr>
+  <p:transition spd="slow">
+    <p:push dir="u"/>
+  </p:transition>
+</p:sld>
+</file>
+
+<file path=ppt/slides/slide5.xml><?xml version="1.0" encoding="utf-8"?>
+<p:sld xmlns:a="http://schemas.openxmlformats.org/drawingml/2006/main" xmlns:r="http://schemas.openxmlformats.org/officeDocument/2006/relationships" xmlns:p="http://schemas.openxmlformats.org/presentationml/2006/main">
+  <p:cSld>
+    <p:spTree>
+      <p:nvGrpSpPr>
+        <p:cNvPr id="1" name=""/>
+        <p:cNvGrpSpPr/>
+        <p:nvPr/>
+      </p:nvGrpSpPr>
+      <p:grpSpPr>
+        <a:xfrm>
+          <a:off x="0" y="0"/>
+          <a:ext cx="0" cy="0"/>
+          <a:chOff x="0" y="0"/>
+          <a:chExt cx="0" cy="0"/>
+        </a:xfrm>
+      </p:grpSpPr>
+      <p:sp>
+        <p:nvSpPr>
+          <p:cNvPr id="2" name="Title 1">
+            <a:extLst>
+              <a:ext uri="{FF2B5EF4-FFF2-40B4-BE49-F238E27FC236}">
+                <a16:creationId xmlns:a16="http://schemas.microsoft.com/office/drawing/2014/main" id="{93AD0CDA-D900-4F17-A300-087561548CB9}"/>
+              </a:ext>
+            </a:extLst>
+          </p:cNvPr>
+          <p:cNvSpPr>
+            <a:spLocks noGrp="1"/>
+          </p:cNvSpPr>
+          <p:nvPr>
+            <p:ph type="title"/>
+          </p:nvPr>
+        </p:nvSpPr>
+        <p:spPr/>
+        <p:txBody>
+          <a:bodyPr/>
+          <a:lstStyle/>
+          <a:p>
+            <a:r>
+              <a:rPr lang="en-US" dirty="0"/>
+              <a:t>Data Model</a:t>
+            </a:r>
+          </a:p>
+        </p:txBody>
+      </p:sp>
+      <p:sp>
+        <p:nvSpPr>
+          <p:cNvPr id="3" name="Content Placeholder 2">
+            <a:extLst>
+              <a:ext uri="{FF2B5EF4-FFF2-40B4-BE49-F238E27FC236}">
+                <a16:creationId xmlns:a16="http://schemas.microsoft.com/office/drawing/2014/main" id="{BEABE899-9555-4FD1-9BF7-CEDD7C8CD6D6}"/>
+              </a:ext>
+            </a:extLst>
+          </p:cNvPr>
+          <p:cNvSpPr>
+            <a:spLocks noGrp="1"/>
+          </p:cNvSpPr>
+          <p:nvPr>
+            <p:ph idx="1"/>
+          </p:nvPr>
+        </p:nvSpPr>
+        <p:spPr/>
+        <p:txBody>
+          <a:bodyPr vert="horz" lIns="91440" tIns="45720" rIns="91440" bIns="45720" rtlCol="0" anchor="t">
+            <a:normAutofit/>
+          </a:bodyPr>
+          <a:lstStyle/>
+          <a:p>
+            <a:pPr marL="0" indent="0">
+              <a:buNone/>
+            </a:pPr>
+            <a:r>
+              <a:rPr lang="en-US" dirty="0"/>
+              <a:t>Berkeley DB Specifics</a:t>
+            </a:r>
+            <a:endParaRPr lang="nl-NL" dirty="0"/>
+          </a:p>
+          <a:p>
+            <a:pPr marL="0" indent="0">
+              <a:buNone/>
+            </a:pPr>
+            <a:endParaRPr lang="en-US" dirty="0"/>
+          </a:p>
+          <a:p>
+            <a:r>
+              <a:rPr lang="en-US" dirty="0"/>
+              <a:t>Store Type</a:t>
+            </a:r>
+          </a:p>
+          <a:p>
+            <a:pPr lvl="1"/>
+            <a:r>
+              <a:rPr lang="en-US" dirty="0"/>
+              <a:t>Ordered Key-Value Store</a:t>
+            </a:r>
+          </a:p>
+          <a:p>
+            <a:r>
+              <a:rPr lang="en-US" dirty="0"/>
+              <a:t>Size</a:t>
+            </a:r>
+          </a:p>
+          <a:p>
+            <a:pPr lvl="1"/>
+            <a:r>
+              <a:rPr lang="en-US" dirty="0"/>
+              <a:t>2³² bytes key 		&lt;–&gt; 		2³² bytes value</a:t>
+            </a:r>
+          </a:p>
+          <a:p>
+            <a:r>
+              <a:rPr lang="en-US" dirty="0"/>
+              <a:t>Database type</a:t>
+            </a:r>
+          </a:p>
+          <a:p>
+            <a:pPr lvl="1"/>
+            <a:r>
+              <a:rPr lang="en-US" dirty="0"/>
+              <a:t>Embedded</a:t>
+            </a:r>
+          </a:p>
+        </p:txBody>
+      </p:sp>
+    </p:spTree>
+    <p:extLst>
+      <p:ext uri="{BB962C8B-B14F-4D97-AF65-F5344CB8AC3E}">
+        <p14:creationId xmlns:p14="http://schemas.microsoft.com/office/powerpoint/2010/main" val="577841922"/>
+      </p:ext>
+    </p:extLst>
+  </p:cSld>
+  <p:clrMapOvr>
+    <a:masterClrMapping/>
+  </p:clrMapOvr>
+  <p:transition spd="slow">
+    <p:push dir="u"/>
+  </p:transition>
+</p:sld>
+</file>
+
+<file path=ppt/slides/slide6.xml><?xml version="1.0" encoding="utf-8"?>
+<p:sld xmlns:a="http://schemas.openxmlformats.org/drawingml/2006/main" xmlns:r="http://schemas.openxmlformats.org/officeDocument/2006/relationships" xmlns:p="http://schemas.openxmlformats.org/presentationml/2006/main">
+  <p:cSld>
+    <p:spTree>
+      <p:nvGrpSpPr>
+        <p:cNvPr id="1" name=""/>
+        <p:cNvGrpSpPr/>
+        <p:nvPr/>
+      </p:nvGrpSpPr>
+      <p:grpSpPr>
+        <a:xfrm>
+          <a:off x="0" y="0"/>
+          <a:ext cx="0" cy="0"/>
+          <a:chOff x="0" y="0"/>
+          <a:chExt cx="0" cy="0"/>
+        </a:xfrm>
+      </p:grpSpPr>
+      <p:sp>
+        <p:nvSpPr>
+          <p:cNvPr id="2" name="Titel 1">
+            <a:extLst>
+              <a:ext uri="{FF2B5EF4-FFF2-40B4-BE49-F238E27FC236}">
+                <a16:creationId xmlns:a16="http://schemas.microsoft.com/office/drawing/2014/main" id="{3A73A78F-83C7-4666-AD3F-F26F954CF395}"/>
+              </a:ext>
+            </a:extLst>
+          </p:cNvPr>
+          <p:cNvSpPr>
+            <a:spLocks noGrp="1"/>
+          </p:cNvSpPr>
+          <p:nvPr>
+            <p:ph type="title"/>
+          </p:nvPr>
+        </p:nvSpPr>
+        <p:spPr/>
+        <p:txBody>
+          <a:bodyPr/>
+          <a:lstStyle/>
+          <a:p>
+            <a:r>
+              <a:rPr lang="nl-NL"/>
+              <a:t>When to use</a:t>
+            </a:r>
+          </a:p>
+        </p:txBody>
+      </p:sp>
+      <p:sp>
+        <p:nvSpPr>
+          <p:cNvPr id="3" name="Tijdelijke aanduiding voor inhoud 2">
+            <a:extLst>
+              <a:ext uri="{FF2B5EF4-FFF2-40B4-BE49-F238E27FC236}">
+                <a16:creationId xmlns:a16="http://schemas.microsoft.com/office/drawing/2014/main" id="{0781C643-32D6-4E2F-B9B0-E895CB5AD395}"/>
+              </a:ext>
+            </a:extLst>
+          </p:cNvPr>
+          <p:cNvSpPr>
+            <a:spLocks noGrp="1"/>
+          </p:cNvSpPr>
+          <p:nvPr>
+            <p:ph idx="1"/>
+          </p:nvPr>
+        </p:nvSpPr>
+        <p:spPr/>
+        <p:txBody>
+          <a:bodyPr vert="horz" lIns="91440" tIns="45720" rIns="91440" bIns="45720" rtlCol="0" anchor="t">
+            <a:normAutofit/>
+          </a:bodyPr>
+          <a:lstStyle/>
+          <a:p>
+            <a:r>
+              <a:rPr lang="nl-NL"/>
+              <a:t>When you can predict data access patterns</a:t>
+            </a:r>
+          </a:p>
+          <a:p>
+            <a:r>
+              <a:rPr lang="nl-NL"/>
+              <a:t>Many customers -&gt; don't have to buy, install, manage separate DB</a:t>
+            </a:r>
+          </a:p>
+          <a:p>
+            <a:r>
+              <a:rPr lang="nl-NL"/>
+              <a:t>Application remains unattended for long periods</a:t>
+            </a:r>
+          </a:p>
+          <a:p>
+            <a:r>
+              <a:rPr lang="nl-NL"/>
+              <a:t>End users are non-sophisticated administrators</a:t>
+            </a:r>
+            <a:endParaRPr lang="nl-NL" dirty="0"/>
+          </a:p>
+        </p:txBody>
+      </p:sp>
+    </p:spTree>
+    <p:extLst>
+      <p:ext uri="{BB962C8B-B14F-4D97-AF65-F5344CB8AC3E}">
+        <p14:creationId xmlns:p14="http://schemas.microsoft.com/office/powerpoint/2010/main" val="4078485349"/>
+      </p:ext>
+    </p:extLst>
+  </p:cSld>
+  <p:clrMapOvr>
+    <a:masterClrMapping/>
+  </p:clrMapOvr>
+  <p:transition spd="slow">
+    <p:push dir="u"/>
+  </p:transition>
+</p:sld>
+</file>
+
+<file path=ppt/slides/slide7.xml><?xml version="1.0" encoding="utf-8"?>
+<p:sld xmlns:a="http://schemas.openxmlformats.org/drawingml/2006/main" xmlns:r="http://schemas.openxmlformats.org/officeDocument/2006/relationships" xmlns:p="http://schemas.openxmlformats.org/presentationml/2006/main">
+  <p:cSld>
+    <p:spTree>
+      <p:nvGrpSpPr>
+        <p:cNvPr id="1" name=""/>
+        <p:cNvGrpSpPr/>
+        <p:nvPr/>
+      </p:nvGrpSpPr>
+      <p:grpSpPr>
+        <a:xfrm>
+          <a:off x="0" y="0"/>
+          <a:ext cx="0" cy="0"/>
+          <a:chOff x="0" y="0"/>
+          <a:chExt cx="0" cy="0"/>
+        </a:xfrm>
+      </p:grpSpPr>
+      <p:sp>
+        <p:nvSpPr>
+          <p:cNvPr id="2" name="Titel 1">
+            <a:extLst>
+              <a:ext uri="{FF2B5EF4-FFF2-40B4-BE49-F238E27FC236}">
+                <a16:creationId xmlns:a16="http://schemas.microsoft.com/office/drawing/2014/main" id="{412D9A8A-313F-4AE4-884D-A6A076B00406}"/>
+              </a:ext>
+            </a:extLst>
+          </p:cNvPr>
+          <p:cNvSpPr>
+            <a:spLocks noGrp="1"/>
+          </p:cNvSpPr>
+          <p:nvPr>
+            <p:ph type="title"/>
+          </p:nvPr>
+        </p:nvSpPr>
+        <p:spPr/>
+        <p:txBody>
+          <a:bodyPr/>
+          <a:lstStyle/>
+          <a:p>
+            <a:r>
+              <a:rPr lang="nl-NL"/>
+              <a:t>When NOT to use</a:t>
+            </a:r>
+          </a:p>
+        </p:txBody>
+      </p:sp>
+      <p:sp>
+        <p:nvSpPr>
+          <p:cNvPr id="3" name="Tijdelijke aanduiding voor inhoud 2">
+            <a:extLst>
+              <a:ext uri="{FF2B5EF4-FFF2-40B4-BE49-F238E27FC236}">
+                <a16:creationId xmlns:a16="http://schemas.microsoft.com/office/drawing/2014/main" id="{178DDD75-E1CE-4E9A-8EF4-5D6D4A60EB4D}"/>
+              </a:ext>
+            </a:extLst>
+          </p:cNvPr>
+          <p:cNvSpPr>
+            <a:spLocks noGrp="1"/>
+          </p:cNvSpPr>
+          <p:nvPr>
+            <p:ph idx="1"/>
+          </p:nvPr>
+        </p:nvSpPr>
+        <p:spPr/>
+        <p:txBody>
+          <a:bodyPr vert="horz" lIns="91440" tIns="45720" rIns="91440" bIns="45720" rtlCol="0" anchor="t">
+            <a:normAutofit/>
+          </a:bodyPr>
+          <a:lstStyle/>
+          <a:p>
+            <a:r>
+              <a:rPr lang="nl-NL"/>
+              <a:t>Application needs different services</a:t>
+            </a:r>
+          </a:p>
+          <a:p>
+            <a:r>
+              <a:rPr lang="nl-NL"/>
+              <a:t>You can't predict how you need to access your data</a:t>
+            </a:r>
+          </a:p>
+          <a:p>
+            <a:r>
+              <a:rPr lang="nl-NL"/>
+              <a:t>Complex SQL Queries (non key-value queries)</a:t>
+            </a:r>
+            <a:endParaRPr lang="nl-NL" dirty="0"/>
+          </a:p>
+        </p:txBody>
+      </p:sp>
+    </p:spTree>
+    <p:extLst>
+      <p:ext uri="{BB962C8B-B14F-4D97-AF65-F5344CB8AC3E}">
+        <p14:creationId xmlns:p14="http://schemas.microsoft.com/office/powerpoint/2010/main" val="1674278190"/>
+      </p:ext>
+    </p:extLst>
+  </p:cSld>
+  <p:clrMapOvr>
+    <a:masterClrMapping/>
+  </p:clrMapOvr>
+  <p:transition spd="slow">
+    <p:push dir="u"/>
+  </p:transition>
+</p:sld>
+</file>
+
+<file path=ppt/slides/slide8.xml><?xml version="1.0" encoding="utf-8"?>
+<p:sld xmlns:a="http://schemas.openxmlformats.org/drawingml/2006/main" xmlns:r="http://schemas.openxmlformats.org/officeDocument/2006/relationships" xmlns:p="http://schemas.openxmlformats.org/presentationml/2006/main">
+  <p:cSld>
+    <p:spTree>
+      <p:nvGrpSpPr>
+        <p:cNvPr id="1" name=""/>
+        <p:cNvGrpSpPr/>
+        <p:nvPr/>
+      </p:nvGrpSpPr>
+      <p:grpSpPr>
+        <a:xfrm>
+          <a:off x="0" y="0"/>
+          <a:ext cx="0" cy="0"/>
+          <a:chOff x="0" y="0"/>
+          <a:chExt cx="0" cy="0"/>
+        </a:xfrm>
+      </p:grpSpPr>
+      <p:sp>
+        <p:nvSpPr>
+          <p:cNvPr id="2" name="Title 1">
+            <a:extLst>
+              <a:ext uri="{FF2B5EF4-FFF2-40B4-BE49-F238E27FC236}">
+                <a16:creationId xmlns:a16="http://schemas.microsoft.com/office/drawing/2014/main" id="{271A26CD-7ECE-40D5-B618-DCF46D551BFF}"/>
+              </a:ext>
+            </a:extLst>
+          </p:cNvPr>
+          <p:cNvSpPr>
+            <a:spLocks noGrp="1"/>
+          </p:cNvSpPr>
+          <p:nvPr>
+            <p:ph type="title"/>
+          </p:nvPr>
+        </p:nvSpPr>
+        <p:spPr/>
+        <p:txBody>
+          <a:bodyPr/>
+          <a:lstStyle/>
+          <a:p>
+            <a:r>
+              <a:rPr lang="en-US" dirty="0"/>
+              <a:t>Principles of Berkeley DB</a:t>
+            </a:r>
+          </a:p>
+        </p:txBody>
+      </p:sp>
+      <p:sp>
+        <p:nvSpPr>
+          <p:cNvPr id="3" name="Content Placeholder 2">
+            <a:extLst>
+              <a:ext uri="{FF2B5EF4-FFF2-40B4-BE49-F238E27FC236}">
+                <a16:creationId xmlns:a16="http://schemas.microsoft.com/office/drawing/2014/main" id="{5FF36FCF-EE0B-428B-A3B0-984BFA08A522}"/>
+              </a:ext>
+            </a:extLst>
+          </p:cNvPr>
+          <p:cNvSpPr>
+            <a:spLocks noGrp="1"/>
+          </p:cNvSpPr>
+          <p:nvPr>
+            <p:ph idx="1"/>
+          </p:nvPr>
+        </p:nvSpPr>
+        <p:spPr>
+          <a:xfrm>
+            <a:off x="677334" y="1933702"/>
+            <a:ext cx="8596668" cy="3178706"/>
+          </a:xfrm>
+        </p:spPr>
+        <p:txBody>
+          <a:bodyPr/>
+          <a:lstStyle/>
+          <a:p>
+            <a:r>
+              <a:rPr lang="en-US" dirty="0"/>
+              <a:t>ACID</a:t>
+            </a:r>
+          </a:p>
+          <a:p>
+            <a:r>
+              <a:rPr lang="en-US" dirty="0"/>
+              <a:t>Performance</a:t>
+            </a:r>
+          </a:p>
+          <a:p>
+            <a:r>
+              <a:rPr lang="en-US" dirty="0"/>
+              <a:t>Querying</a:t>
+            </a:r>
+          </a:p>
+          <a:p>
+            <a:r>
+              <a:rPr lang="en-US" dirty="0"/>
+              <a:t>Limitations</a:t>
+            </a:r>
+          </a:p>
+        </p:txBody>
+      </p:sp>
+      <p:pic>
+        <p:nvPicPr>
+          <p:cNvPr id="5" name="Picture 4">
+            <a:extLst>
+              <a:ext uri="{FF2B5EF4-FFF2-40B4-BE49-F238E27FC236}">
+                <a16:creationId xmlns:a16="http://schemas.microsoft.com/office/drawing/2014/main" id="{3394960A-5957-4D87-AAF1-4850F49289D8}"/>
+              </a:ext>
+            </a:extLst>
+          </p:cNvPr>
+          <p:cNvPicPr>
+            <a:picLocks noChangeAspect="1"/>
+          </p:cNvPicPr>
+          <p:nvPr/>
+        </p:nvPicPr>
+        <p:blipFill>
+          <a:blip r:embed="rId3">
+            <a:extLst>
+              <a:ext uri="{28A0092B-C50C-407E-A947-70E740481C1C}">
+                <a14:useLocalDpi xmlns:a14="http://schemas.microsoft.com/office/drawing/2010/main" val="0"/>
+              </a:ext>
+            </a:extLst>
+          </a:blip>
+          <a:stretch>
+            <a:fillRect/>
+          </a:stretch>
+        </p:blipFill>
+        <p:spPr>
+          <a:xfrm>
+            <a:off x="5270943" y="1694359"/>
+            <a:ext cx="5663757" cy="1408174"/>
+          </a:xfrm>
+          <a:prstGeom prst="rect">
+            <a:avLst/>
+          </a:prstGeom>
+        </p:spPr>
+      </p:pic>
+      <p:sp>
+        <p:nvSpPr>
+          <p:cNvPr id="6" name="Rectangle 5">
+            <a:extLst>
+              <a:ext uri="{FF2B5EF4-FFF2-40B4-BE49-F238E27FC236}">
+                <a16:creationId xmlns:a16="http://schemas.microsoft.com/office/drawing/2014/main" id="{3A540B5E-E1AC-45C2-AD8D-765C2E433DF1}"/>
+              </a:ext>
+            </a:extLst>
+          </p:cNvPr>
+          <p:cNvSpPr/>
+          <p:nvPr/>
+        </p:nvSpPr>
+        <p:spPr>
+          <a:xfrm>
+            <a:off x="5618691" y="3102533"/>
+            <a:ext cx="4563534" cy="200055"/>
+          </a:xfrm>
+          <a:prstGeom prst="rect">
+            <a:avLst/>
+          </a:prstGeom>
+        </p:spPr>
+        <p:txBody>
+          <a:bodyPr wrap="square">
+            <a:spAutoFit/>
+          </a:bodyPr>
+          <a:lstStyle/>
+          <a:p>
+            <a:r>
+              <a:rPr lang="en-US" sz="700" dirty="0">
+                <a:solidFill>
+                  <a:schemeClr val="bg1">
+                    <a:lumMod val="65000"/>
+                  </a:schemeClr>
+                </a:solidFill>
+              </a:rPr>
+              <a:t>http://highscalability.com/blog/2012/11/29/performance-data-for-leveldb-berkley-db-and-bangdb-for-rando.html</a:t>
+            </a:r>
+            <a:endParaRPr lang="en-NL" sz="700" dirty="0">
+              <a:solidFill>
+                <a:schemeClr val="bg1">
+                  <a:lumMod val="65000"/>
+                </a:schemeClr>
+              </a:solidFill>
+            </a:endParaRPr>
+          </a:p>
+        </p:txBody>
+      </p:sp>
+    </p:spTree>
+    <p:extLst>
+      <p:ext uri="{BB962C8B-B14F-4D97-AF65-F5344CB8AC3E}">
+        <p14:creationId xmlns:p14="http://schemas.microsoft.com/office/powerpoint/2010/main" val="1007026661"/>
+      </p:ext>
+    </p:extLst>
+  </p:cSld>
+  <p:clrMapOvr>
+    <a:masterClrMapping/>
+  </p:clrMapOvr>
+  <p:transition spd="slow">
+    <p:push dir="u"/>
+  </p:transition>
+</p:sld>
+</file>
+
+<file path=ppt/slides/slide9.xml><?xml version="1.0" encoding="utf-8"?>
+<p:sld xmlns:a="http://schemas.openxmlformats.org/drawingml/2006/main" xmlns:r="http://schemas.openxmlformats.org/officeDocument/2006/relationships" xmlns:p="http://schemas.openxmlformats.org/presentationml/2006/main">
+  <p:cSld>
+    <p:spTree>
+      <p:nvGrpSpPr>
+        <p:cNvPr id="1" name=""/>
+        <p:cNvGrpSpPr/>
+        <p:nvPr/>
+      </p:nvGrpSpPr>
+      <p:grpSpPr>
+        <a:xfrm>
+          <a:off x="0" y="0"/>
+          <a:ext cx="0" cy="0"/>
+          <a:chOff x="0" y="0"/>
+          <a:chExt cx="0" cy="0"/>
+        </a:xfrm>
+      </p:grpSpPr>
+      <p:sp>
+        <p:nvSpPr>
+          <p:cNvPr id="2" name="Titel 1">
+            <a:extLst>
+              <a:ext uri="{FF2B5EF4-FFF2-40B4-BE49-F238E27FC236}">
+                <a16:creationId xmlns:a16="http://schemas.microsoft.com/office/drawing/2014/main" id="{4C974D38-A875-4FE0-A3BF-9DC02FF076D9}"/>
+              </a:ext>
+            </a:extLst>
+          </p:cNvPr>
+          <p:cNvSpPr>
+            <a:spLocks noGrp="1"/>
+          </p:cNvSpPr>
+          <p:nvPr>
+            <p:ph type="title"/>
+          </p:nvPr>
+        </p:nvSpPr>
+        <p:spPr/>
+        <p:txBody>
+          <a:bodyPr/>
+          <a:lstStyle/>
+          <a:p>
+            <a:r>
+              <a:rPr lang="en-US" dirty="0"/>
+              <a:t>Principles</a:t>
+            </a:r>
+            <a:r>
+              <a:rPr lang="nl-NL" dirty="0"/>
+              <a:t> of Berkeley DB</a:t>
+            </a:r>
+          </a:p>
+        </p:txBody>
+      </p:sp>
+      <p:sp>
+        <p:nvSpPr>
+          <p:cNvPr id="3" name="Tijdelijke aanduiding voor inhoud 2">
+            <a:extLst>
+              <a:ext uri="{FF2B5EF4-FFF2-40B4-BE49-F238E27FC236}">
+                <a16:creationId xmlns:a16="http://schemas.microsoft.com/office/drawing/2014/main" id="{EFF8583D-63B2-4788-8805-671F0FFA27E3}"/>
+              </a:ext>
+            </a:extLst>
+          </p:cNvPr>
+          <p:cNvSpPr>
+            <a:spLocks noGrp="1"/>
+          </p:cNvSpPr>
+          <p:nvPr>
+            <p:ph idx="1"/>
+          </p:nvPr>
+        </p:nvSpPr>
+        <p:spPr/>
+        <p:txBody>
+          <a:bodyPr vert="horz" lIns="91440" tIns="45720" rIns="91440" bIns="45720" rtlCol="0" anchor="t">
+            <a:normAutofit/>
+          </a:bodyPr>
+          <a:lstStyle/>
+          <a:p>
+            <a:pPr marL="0" indent="0">
+              <a:buNone/>
+            </a:pPr>
+            <a:r>
+              <a:rPr lang="nl-NL" dirty="0"/>
+              <a:t>ACID</a:t>
+            </a:r>
+          </a:p>
+          <a:p>
+            <a:r>
+              <a:rPr lang="nl-NL" dirty="0" err="1"/>
+              <a:t>Atomicity</a:t>
+            </a:r>
+          </a:p>
+          <a:p>
+            <a:r>
+              <a:rPr lang="nl-NL" dirty="0" err="1"/>
+              <a:t>Consistency</a:t>
+            </a:r>
+          </a:p>
+          <a:p>
+            <a:r>
+              <a:rPr lang="nl-NL" dirty="0" err="1"/>
+              <a:t>Integrity</a:t>
+            </a:r>
+          </a:p>
+          <a:p>
+            <a:r>
+              <a:rPr lang="nl-NL" dirty="0" err="1"/>
+              <a:t>Durability</a:t>
+            </a:r>
+          </a:p>
+        </p:txBody>
+      </p:sp>
+    </p:spTree>
+    <p:extLst>
+      <p:ext uri="{BB962C8B-B14F-4D97-AF65-F5344CB8AC3E}">
+        <p14:creationId xmlns:p14="http://schemas.microsoft.com/office/powerpoint/2010/main" val="3394059389"/>
+      </p:ext>
+    </p:extLst>
+  </p:cSld>
+  <p:clrMapOvr>
+    <a:masterClrMapping/>
+  </p:clrMapOvr>
+  <p:transition spd="slow">
+    <p:push dir="u"/>
+  </p:transition>
+</p:sld>
+</file>
+
 <file path=ppt/theme/theme1.xml><?xml version="1.0" encoding="utf-8"?>
 <a:theme xmlns:a="http://schemas.openxmlformats.org/drawingml/2006/main" name="Facet">
   <a:themeElements>

</xml_diff>

<commit_message>
Did some acid shit
</commit_message>
<xml_diff>
--- a/Berkeley DB.pptx
+++ b/Berkeley DB.pptx
@@ -5,7 +5,7 @@
     <p:sldMasterId id="2147483689" r:id="rId1"/>
   </p:sldMasterIdLst>
   <p:notesMasterIdLst>
-    <p:notesMasterId r:id="rId14"/>
+    <p:notesMasterId r:id="rId16"/>
   </p:notesMasterIdLst>
   <p:sldIdLst>
     <p:sldId id="256" r:id="rId2"/>
@@ -17,9 +17,11 @@
     <p:sldId id="266" r:id="rId8"/>
     <p:sldId id="259" r:id="rId9"/>
     <p:sldId id="263" r:id="rId10"/>
-    <p:sldId id="267" r:id="rId11"/>
-    <p:sldId id="260" r:id="rId12"/>
-    <p:sldId id="261" r:id="rId13"/>
+    <p:sldId id="269" r:id="rId11"/>
+    <p:sldId id="267" r:id="rId12"/>
+    <p:sldId id="260" r:id="rId13"/>
+    <p:sldId id="268" r:id="rId14"/>
+    <p:sldId id="261" r:id="rId15"/>
   </p:sldIdLst>
   <p:sldSz cx="12192000" cy="6858000"/>
   <p:notesSz cx="6858000" cy="9144000"/>
@@ -1274,6 +1276,111 @@
           <a:p>
             <a:r>
               <a:rPr lang="en-US" dirty="0"/>
+              <a:t>According to oracle, completely ACID </a:t>
+            </a:r>
+            <a:r>
+              <a:rPr lang="en-US"/>
+              <a:t>compliant.</a:t>
+            </a:r>
+            <a:endParaRPr lang="en-US" dirty="0"/>
+          </a:p>
+          <a:p>
+            <a:r>
+              <a:rPr lang="en-US" dirty="0"/>
+              <a:t>Consistency guaranteed, unless database configured to disable</a:t>
+            </a:r>
+          </a:p>
+          <a:p>
+            <a:r>
+              <a:rPr lang="en-US" dirty="0"/>
+              <a:t>Durability is configured in the application</a:t>
+            </a:r>
+            <a:endParaRPr lang="en-NL" dirty="0"/>
+          </a:p>
+        </p:txBody>
+      </p:sp>
+      <p:sp>
+        <p:nvSpPr>
+          <p:cNvPr id="4" name="Slide Number Placeholder 3"/>
+          <p:cNvSpPr>
+            <a:spLocks noGrp="1"/>
+          </p:cNvSpPr>
+          <p:nvPr>
+            <p:ph type="sldNum" sz="quarter" idx="5"/>
+          </p:nvPr>
+        </p:nvSpPr>
+        <p:spPr/>
+        <p:txBody>
+          <a:bodyPr/>
+          <a:lstStyle/>
+          <a:p>
+            <a:fld id="{2C1893C1-AA60-43C7-A9DB-CA01F4DE58A1}" type="slidenum">
+              <a:rPr lang="en-US" smtClean="0"/>
+              <a:t>9</a:t>
+            </a:fld>
+            <a:endParaRPr lang="en-US"/>
+          </a:p>
+        </p:txBody>
+      </p:sp>
+    </p:spTree>
+    <p:extLst>
+      <p:ext uri="{BB962C8B-B14F-4D97-AF65-F5344CB8AC3E}">
+        <p14:creationId xmlns:p14="http://schemas.microsoft.com/office/powerpoint/2010/main" val="3821087154"/>
+      </p:ext>
+    </p:extLst>
+  </p:cSld>
+  <p:clrMapOvr>
+    <a:masterClrMapping/>
+  </p:clrMapOvr>
+</p:notes>
+</file>
+
+<file path=ppt/notesSlides/notesSlide9.xml><?xml version="1.0" encoding="utf-8"?>
+<p:notes xmlns:a="http://schemas.openxmlformats.org/drawingml/2006/main" xmlns:r="http://schemas.openxmlformats.org/officeDocument/2006/relationships" xmlns:p="http://schemas.openxmlformats.org/presentationml/2006/main">
+  <p:cSld>
+    <p:spTree>
+      <p:nvGrpSpPr>
+        <p:cNvPr id="1" name=""/>
+        <p:cNvGrpSpPr/>
+        <p:nvPr/>
+      </p:nvGrpSpPr>
+      <p:grpSpPr>
+        <a:xfrm>
+          <a:off x="0" y="0"/>
+          <a:ext cx="0" cy="0"/>
+          <a:chOff x="0" y="0"/>
+          <a:chExt cx="0" cy="0"/>
+        </a:xfrm>
+      </p:grpSpPr>
+      <p:sp>
+        <p:nvSpPr>
+          <p:cNvPr id="2" name="Slide Image Placeholder 1"/>
+          <p:cNvSpPr>
+            <a:spLocks noGrp="1" noRot="1" noChangeAspect="1"/>
+          </p:cNvSpPr>
+          <p:nvPr>
+            <p:ph type="sldImg"/>
+          </p:nvPr>
+        </p:nvSpPr>
+        <p:spPr/>
+      </p:sp>
+      <p:sp>
+        <p:nvSpPr>
+          <p:cNvPr id="3" name="Notes Placeholder 2"/>
+          <p:cNvSpPr>
+            <a:spLocks noGrp="1"/>
+          </p:cNvSpPr>
+          <p:nvPr>
+            <p:ph type="body" idx="1"/>
+          </p:nvPr>
+        </p:nvSpPr>
+        <p:spPr/>
+        <p:txBody>
+          <a:bodyPr/>
+          <a:lstStyle/>
+          <a:p>
+            <a:r>
+              <a:rPr lang="en-US" dirty="0"/>
               <a:t>Amazon</a:t>
             </a:r>
           </a:p>
@@ -1307,7 +1414,7 @@
           <a:p>
             <a:fld id="{2C1893C1-AA60-43C7-A9DB-CA01F4DE58A1}" type="slidenum">
               <a:rPr lang="en-US" smtClean="0"/>
-              <a:t>11</a:t>
+              <a:t>12</a:t>
             </a:fld>
             <a:endParaRPr lang="en-US"/>
           </a:p>
@@ -7216,7 +7323,7 @@
           <p:cNvPr id="2" name="Title 1">
             <a:extLst>
               <a:ext uri="{FF2B5EF4-FFF2-40B4-BE49-F238E27FC236}">
-                <a16:creationId xmlns:a16="http://schemas.microsoft.com/office/drawing/2014/main" id="{EFA715D2-6711-46CE-8548-DFF6CEF8C117}"/>
+                <a16:creationId xmlns:a16="http://schemas.microsoft.com/office/drawing/2014/main" id="{B6BBDD5B-828C-4AC8-93FF-FA4156D03A50}"/>
               </a:ext>
             </a:extLst>
           </p:cNvPr>
@@ -7249,7 +7356,7 @@
           <p:cNvPr id="3" name="Content Placeholder 2">
             <a:extLst>
               <a:ext uri="{FF2B5EF4-FFF2-40B4-BE49-F238E27FC236}">
-                <a16:creationId xmlns:a16="http://schemas.microsoft.com/office/drawing/2014/main" id="{496B3528-2BEF-4E4D-B923-88E2AD386F0F}"/>
+                <a16:creationId xmlns:a16="http://schemas.microsoft.com/office/drawing/2014/main" id="{A74F4CF8-DA3A-4E3E-82EF-EF8CC63EC082}"/>
               </a:ext>
             </a:extLst>
           </p:cNvPr>
@@ -7262,9 +7369,7 @@
         </p:nvSpPr>
         <p:spPr/>
         <p:txBody>
-          <a:bodyPr>
-            <a:normAutofit lnSpcReduction="10000"/>
-          </a:bodyPr>
+          <a:bodyPr/>
           <a:lstStyle/>
           <a:p>
             <a:pPr marL="0" indent="0">
@@ -7272,74 +7377,19 @@
             </a:pPr>
             <a:r>
               <a:rPr lang="en-US" dirty="0"/>
-              <a:t>Limitations</a:t>
+              <a:t>Querying</a:t>
             </a:r>
           </a:p>
           <a:p>
             <a:r>
               <a:rPr lang="en-US" dirty="0"/>
-              <a:t>Database Size depends on </a:t>
-            </a:r>
-            <a:r>
-              <a:rPr lang="en-US"/>
-              <a:t>page size</a:t>
-            </a:r>
-            <a:endParaRPr lang="en-US" dirty="0"/>
+              <a:t>Key-Data</a:t>
+            </a:r>
           </a:p>
           <a:p>
             <a:r>
               <a:rPr lang="en-US" dirty="0"/>
-              <a:t>Page size is chosen by application</a:t>
-            </a:r>
-          </a:p>
-          <a:p>
-            <a:r>
-              <a:rPr lang="en-US" dirty="0"/>
-              <a:t>Page sizes are saved as unsigned 16-bit numbers</a:t>
-            </a:r>
-          </a:p>
-          <a:p>
-            <a:r>
-              <a:rPr lang="en-US" dirty="0"/>
-              <a:t>Minimum page size: 512 bytes</a:t>
-            </a:r>
-          </a:p>
-          <a:p>
-            <a:r>
-              <a:rPr lang="en-US" dirty="0"/>
-              <a:t>Maximum page size: 65.536 bytes</a:t>
-            </a:r>
-          </a:p>
-          <a:p>
-            <a:r>
-              <a:rPr lang="en-US" dirty="0"/>
-              <a:t>Minimum-maximum database file size: 2^41 (2 terabytes)</a:t>
-            </a:r>
-          </a:p>
-          <a:p>
-            <a:r>
-              <a:rPr lang="en-US" dirty="0"/>
-              <a:t>Maximum database file size: 2^48 (256 terabytes)</a:t>
-            </a:r>
-          </a:p>
-          <a:p>
-            <a:r>
-              <a:rPr lang="en-US" dirty="0"/>
-              <a:t>Largest key/data item is 2^32</a:t>
-            </a:r>
-          </a:p>
-          <a:p>
-            <a:r>
-              <a:rPr lang="en-US" dirty="0"/>
-              <a:t>Maximum </a:t>
-            </a:r>
-            <a:r>
-              <a:rPr lang="en-US" dirty="0" err="1"/>
-              <a:t>Btree</a:t>
-            </a:r>
-            <a:r>
-              <a:rPr lang="en-US" dirty="0"/>
-              <a:t> depth: 255</a:t>
+              <a:t>No SQL</a:t>
             </a:r>
           </a:p>
         </p:txBody>
@@ -7347,7 +7397,7 @@
     </p:spTree>
     <p:extLst>
       <p:ext uri="{BB962C8B-B14F-4D97-AF65-F5344CB8AC3E}">
-        <p14:creationId xmlns:p14="http://schemas.microsoft.com/office/powerpoint/2010/main" val="2551443014"/>
+        <p14:creationId xmlns:p14="http://schemas.microsoft.com/office/powerpoint/2010/main" val="857384870"/>
       </p:ext>
     </p:extLst>
   </p:cSld>
@@ -7382,6 +7432,175 @@
           <p:cNvPr id="2" name="Title 1">
             <a:extLst>
               <a:ext uri="{FF2B5EF4-FFF2-40B4-BE49-F238E27FC236}">
+                <a16:creationId xmlns:a16="http://schemas.microsoft.com/office/drawing/2014/main" id="{EFA715D2-6711-46CE-8548-DFF6CEF8C117}"/>
+              </a:ext>
+            </a:extLst>
+          </p:cNvPr>
+          <p:cNvSpPr>
+            <a:spLocks noGrp="1"/>
+          </p:cNvSpPr>
+          <p:nvPr>
+            <p:ph type="title"/>
+          </p:nvPr>
+        </p:nvSpPr>
+        <p:spPr/>
+        <p:txBody>
+          <a:bodyPr/>
+          <a:lstStyle/>
+          <a:p>
+            <a:r>
+              <a:rPr lang="en-US" dirty="0"/>
+              <a:t>Principles</a:t>
+            </a:r>
+            <a:r>
+              <a:rPr lang="nl-NL" dirty="0"/>
+              <a:t> of Berkeley DB</a:t>
+            </a:r>
+            <a:endParaRPr lang="en-NL" dirty="0"/>
+          </a:p>
+        </p:txBody>
+      </p:sp>
+      <p:sp>
+        <p:nvSpPr>
+          <p:cNvPr id="3" name="Content Placeholder 2">
+            <a:extLst>
+              <a:ext uri="{FF2B5EF4-FFF2-40B4-BE49-F238E27FC236}">
+                <a16:creationId xmlns:a16="http://schemas.microsoft.com/office/drawing/2014/main" id="{496B3528-2BEF-4E4D-B923-88E2AD386F0F}"/>
+              </a:ext>
+            </a:extLst>
+          </p:cNvPr>
+          <p:cNvSpPr>
+            <a:spLocks noGrp="1"/>
+          </p:cNvSpPr>
+          <p:nvPr>
+            <p:ph idx="1"/>
+          </p:nvPr>
+        </p:nvSpPr>
+        <p:spPr/>
+        <p:txBody>
+          <a:bodyPr>
+            <a:normAutofit lnSpcReduction="10000"/>
+          </a:bodyPr>
+          <a:lstStyle/>
+          <a:p>
+            <a:pPr marL="0" indent="0">
+              <a:buNone/>
+            </a:pPr>
+            <a:r>
+              <a:rPr lang="en-US" dirty="0"/>
+              <a:t>Limitations</a:t>
+            </a:r>
+          </a:p>
+          <a:p>
+            <a:r>
+              <a:rPr lang="en-US" dirty="0"/>
+              <a:t>Database Size depends on page size</a:t>
+            </a:r>
+          </a:p>
+          <a:p>
+            <a:r>
+              <a:rPr lang="en-US" dirty="0"/>
+              <a:t>Page size is chosen by application</a:t>
+            </a:r>
+          </a:p>
+          <a:p>
+            <a:r>
+              <a:rPr lang="en-US" dirty="0"/>
+              <a:t>Page sizes are saved as unsigned 16-bit numbers</a:t>
+            </a:r>
+          </a:p>
+          <a:p>
+            <a:r>
+              <a:rPr lang="en-US" dirty="0"/>
+              <a:t>Minimum page size: 512 bytes</a:t>
+            </a:r>
+          </a:p>
+          <a:p>
+            <a:r>
+              <a:rPr lang="en-US" dirty="0"/>
+              <a:t>Maximum page size: 65.536 bytes</a:t>
+            </a:r>
+          </a:p>
+          <a:p>
+            <a:r>
+              <a:rPr lang="en-US" dirty="0"/>
+              <a:t>Minimum-maximum database file size: 2^41 (2 terabytes)</a:t>
+            </a:r>
+          </a:p>
+          <a:p>
+            <a:r>
+              <a:rPr lang="en-US" dirty="0"/>
+              <a:t>Maximum database file size: 2^48 (256 terabytes)</a:t>
+            </a:r>
+          </a:p>
+          <a:p>
+            <a:r>
+              <a:rPr lang="en-US" dirty="0"/>
+              <a:t>Largest key/data item is 2^32</a:t>
+            </a:r>
+          </a:p>
+          <a:p>
+            <a:r>
+              <a:rPr lang="en-US" dirty="0"/>
+              <a:t>Maximum </a:t>
+            </a:r>
+            <a:r>
+              <a:rPr lang="en-US" dirty="0" err="1"/>
+              <a:t>Btree</a:t>
+            </a:r>
+            <a:r>
+              <a:rPr lang="en-US" dirty="0"/>
+              <a:t> depth: 255</a:t>
+            </a:r>
+          </a:p>
+        </p:txBody>
+      </p:sp>
+    </p:spTree>
+    <p:extLst>
+      <p:ext uri="{BB962C8B-B14F-4D97-AF65-F5344CB8AC3E}">
+        <p14:creationId xmlns:p14="http://schemas.microsoft.com/office/powerpoint/2010/main" val="2551443014"/>
+      </p:ext>
+    </p:extLst>
+  </p:cSld>
+  <p:clrMapOvr>
+    <a:masterClrMapping/>
+  </p:clrMapOvr>
+  <p:transition spd="slow">
+    <p:push dir="u"/>
+  </p:transition>
+</p:sld>
+</file>
+
+<file path=ppt/slides/slide12.xml><?xml version="1.0" encoding="utf-8"?>
+<p:sld xmlns:a="http://schemas.openxmlformats.org/drawingml/2006/main" xmlns:r="http://schemas.openxmlformats.org/officeDocument/2006/relationships" xmlns:p="http://schemas.openxmlformats.org/presentationml/2006/main">
+  <p:cSld>
+    <p:bg>
+      <p:bgPr>
+        <a:solidFill>
+          <a:schemeClr val="bg1"/>
+        </a:solidFill>
+        <a:effectLst/>
+      </p:bgPr>
+    </p:bg>
+    <p:spTree>
+      <p:nvGrpSpPr>
+        <p:cNvPr id="1" name=""/>
+        <p:cNvGrpSpPr/>
+        <p:nvPr/>
+      </p:nvGrpSpPr>
+      <p:grpSpPr>
+        <a:xfrm>
+          <a:off x="0" y="0"/>
+          <a:ext cx="0" cy="0"/>
+          <a:chOff x="0" y="0"/>
+          <a:chExt cx="0" cy="0"/>
+        </a:xfrm>
+      </p:grpSpPr>
+      <p:sp>
+        <p:nvSpPr>
+          <p:cNvPr id="2" name="Title 1">
+            <a:extLst>
+              <a:ext uri="{FF2B5EF4-FFF2-40B4-BE49-F238E27FC236}">
                 <a16:creationId xmlns:a16="http://schemas.microsoft.com/office/drawing/2014/main" id="{5E197B81-A928-4FC8-A0D2-5EE5A82E24A5}"/>
               </a:ext>
             </a:extLst>
@@ -7393,18 +7612,72 @@
             <p:ph type="title"/>
           </p:nvPr>
         </p:nvSpPr>
-        <p:spPr/>
-        <p:txBody>
-          <a:bodyPr/>
-          <a:lstStyle/>
-          <a:p>
-            <a:r>
-              <a:rPr lang="en-US" dirty="0"/>
+        <p:spPr>
+          <a:xfrm>
+            <a:off x="677334" y="609600"/>
+            <a:ext cx="8596668" cy="1320800"/>
+          </a:xfrm>
+        </p:spPr>
+        <p:txBody>
+          <a:bodyPr anchor="t">
+            <a:normAutofit/>
+          </a:bodyPr>
+          <a:lstStyle/>
+          <a:p>
+            <a:r>
+              <a:rPr lang="en-US"/>
               <a:t>Economics</a:t>
             </a:r>
-          </a:p>
-        </p:txBody>
-      </p:sp>
+            <a:endParaRPr lang="en-US" dirty="0"/>
+          </a:p>
+        </p:txBody>
+      </p:sp>
+      <p:pic>
+        <p:nvPicPr>
+          <p:cNvPr id="1026" name="Picture 2" descr="Afbeeldingsresultaat voor bitcoin core">
+            <a:extLst>
+              <a:ext uri="{FF2B5EF4-FFF2-40B4-BE49-F238E27FC236}">
+                <a16:creationId xmlns:a16="http://schemas.microsoft.com/office/drawing/2014/main" id="{01EF6D8D-4127-412D-B30E-F70A47E8AE00}"/>
+              </a:ext>
+            </a:extLst>
+          </p:cNvPr>
+          <p:cNvPicPr>
+            <a:picLocks noChangeAspect="1" noChangeArrowheads="1"/>
+          </p:cNvPicPr>
+          <p:nvPr/>
+        </p:nvPicPr>
+        <p:blipFill>
+          <a:blip r:embed="rId3">
+            <a:extLst>
+              <a:ext uri="{28A0092B-C50C-407E-A947-70E740481C1C}">
+                <a14:useLocalDpi xmlns:a14="http://schemas.microsoft.com/office/drawing/2010/main" val="0"/>
+              </a:ext>
+            </a:extLst>
+          </a:blip>
+          <a:stretch>
+            <a:fillRect/>
+          </a:stretch>
+        </p:blipFill>
+        <p:spPr bwMode="auto">
+          <a:xfrm>
+            <a:off x="817474" y="2159331"/>
+            <a:ext cx="2915973" cy="2915973"/>
+          </a:xfrm>
+          <a:prstGeom prst="rect">
+            <a:avLst/>
+          </a:prstGeom>
+          <a:noFill/>
+          <a:extLst>
+            <a:ext uri="{909E8E84-426E-40DD-AFC4-6F175D3DCCD1}">
+              <a14:hiddenFill xmlns:a14="http://schemas.microsoft.com/office/drawing/2010/main">
+                <a:solidFill>
+                  <a:srgbClr val="FFFFFF"/>
+                </a:solidFill>
+              </a14:hiddenFill>
+            </a:ext>
+          </a:extLst>
+        </p:spPr>
+      </p:pic>
       <p:sp>
         <p:nvSpPr>
           <p:cNvPr id="3" name="Content Placeholder 2">
@@ -7421,6 +7694,81 @@
             <p:ph idx="1"/>
           </p:nvPr>
         </p:nvSpPr>
+        <p:spPr>
+          <a:xfrm>
+            <a:off x="4063160" y="2160589"/>
+            <a:ext cx="5207839" cy="3880773"/>
+          </a:xfrm>
+        </p:spPr>
+        <p:txBody>
+          <a:bodyPr>
+            <a:normAutofit/>
+          </a:bodyPr>
+          <a:lstStyle/>
+          <a:p>
+            <a:r>
+              <a:rPr lang="en-US"/>
+              <a:t>Famous Case</a:t>
+            </a:r>
+          </a:p>
+          <a:p>
+            <a:r>
+              <a:rPr lang="en-US"/>
+              <a:t>Market Share</a:t>
+            </a:r>
+            <a:endParaRPr lang="en-US" dirty="0"/>
+          </a:p>
+        </p:txBody>
+      </p:sp>
+    </p:spTree>
+    <p:extLst>
+      <p:ext uri="{BB962C8B-B14F-4D97-AF65-F5344CB8AC3E}">
+        <p14:creationId xmlns:p14="http://schemas.microsoft.com/office/powerpoint/2010/main" val="814098191"/>
+      </p:ext>
+    </p:extLst>
+  </p:cSld>
+  <p:clrMapOvr>
+    <a:masterClrMapping/>
+  </p:clrMapOvr>
+  <p:transition spd="slow">
+    <p:push dir="u"/>
+  </p:transition>
+</p:sld>
+</file>
+
+<file path=ppt/slides/slide13.xml><?xml version="1.0" encoding="utf-8"?>
+<p:sld xmlns:a="http://schemas.openxmlformats.org/drawingml/2006/main" xmlns:r="http://schemas.openxmlformats.org/officeDocument/2006/relationships" xmlns:p="http://schemas.openxmlformats.org/presentationml/2006/main">
+  <p:cSld>
+    <p:spTree>
+      <p:nvGrpSpPr>
+        <p:cNvPr id="1" name=""/>
+        <p:cNvGrpSpPr/>
+        <p:nvPr/>
+      </p:nvGrpSpPr>
+      <p:grpSpPr>
+        <a:xfrm>
+          <a:off x="0" y="0"/>
+          <a:ext cx="0" cy="0"/>
+          <a:chOff x="0" y="0"/>
+          <a:chExt cx="0" cy="0"/>
+        </a:xfrm>
+      </p:grpSpPr>
+      <p:sp>
+        <p:nvSpPr>
+          <p:cNvPr id="2" name="Title 1">
+            <a:extLst>
+              <a:ext uri="{FF2B5EF4-FFF2-40B4-BE49-F238E27FC236}">
+                <a16:creationId xmlns:a16="http://schemas.microsoft.com/office/drawing/2014/main" id="{A6960DA3-5E1A-4B17-AFEE-BE9CA105F739}"/>
+              </a:ext>
+            </a:extLst>
+          </p:cNvPr>
+          <p:cNvSpPr>
+            <a:spLocks noGrp="1"/>
+          </p:cNvSpPr>
+          <p:nvPr>
+            <p:ph type="title"/>
+          </p:nvPr>
+        </p:nvSpPr>
         <p:spPr/>
         <p:txBody>
           <a:bodyPr/>
@@ -7428,20 +7776,100 @@
           <a:p>
             <a:r>
               <a:rPr lang="en-US" dirty="0"/>
-              <a:t>Market Share</a:t>
-            </a:r>
-          </a:p>
+              <a:t>Economics</a:t>
+            </a:r>
+            <a:endParaRPr lang="en-NL" dirty="0"/>
+          </a:p>
+        </p:txBody>
+      </p:sp>
+      <p:sp>
+        <p:nvSpPr>
+          <p:cNvPr id="3" name="Content Placeholder 2">
+            <a:extLst>
+              <a:ext uri="{FF2B5EF4-FFF2-40B4-BE49-F238E27FC236}">
+                <a16:creationId xmlns:a16="http://schemas.microsoft.com/office/drawing/2014/main" id="{80EC7674-C116-4EF9-A49F-C9E643D7968F}"/>
+              </a:ext>
+            </a:extLst>
+          </p:cNvPr>
+          <p:cNvSpPr>
+            <a:spLocks noGrp="1"/>
+          </p:cNvSpPr>
+          <p:nvPr>
+            <p:ph idx="1"/>
+          </p:nvPr>
+        </p:nvSpPr>
+        <p:spPr/>
+        <p:txBody>
+          <a:bodyPr/>
+          <a:lstStyle/>
           <a:p>
             <a:r>
               <a:rPr lang="en-US" dirty="0"/>
-              <a:t>Famous Case</a:t>
-            </a:r>
-          </a:p>
-          <a:p>
+              <a:t>88</a:t>
+            </a:r>
+            <a:r>
+              <a:rPr lang="en-US" baseline="30000" dirty="0"/>
+              <a:t>th</a:t>
+            </a:r>
             <a:r>
               <a:rPr lang="en-US" dirty="0"/>
-              <a:t>Other</a:t>
-            </a:r>
+              <a:t> - </a:t>
+            </a:r>
+            <a:r>
+              <a:rPr lang="en-US" dirty="0">
+                <a:hlinkClick r:id="rId2"/>
+              </a:rPr>
+              <a:t>https://db-engines.com/en/ranking</a:t>
+            </a:r>
+            <a:endParaRPr lang="en-US" dirty="0"/>
+          </a:p>
+          <a:p>
+            <a:r>
+              <a:rPr lang="en-US" dirty="0"/>
+              <a:t>first released in 1991</a:t>
+            </a:r>
+          </a:p>
+          <a:p>
+            <a:r>
+              <a:rPr lang="en-US" dirty="0"/>
+              <a:t>1996 – 2006 </a:t>
+            </a:r>
+            <a:r>
+              <a:rPr lang="en-US" dirty="0" err="1"/>
+              <a:t>Sleepycat</a:t>
+            </a:r>
+            <a:r>
+              <a:rPr lang="en-US" dirty="0"/>
+              <a:t> Software </a:t>
+            </a:r>
+          </a:p>
+          <a:p>
+            <a:r>
+              <a:rPr lang="en-US" dirty="0"/>
+              <a:t>Acquired in 2006 by Oracle</a:t>
+            </a:r>
+          </a:p>
+          <a:p>
+            <a:endParaRPr lang="en-US" dirty="0"/>
+          </a:p>
+          <a:p>
+            <a:r>
+              <a:rPr lang="en-US" dirty="0"/>
+              <a:t>Oracle Berkeley DB</a:t>
+            </a:r>
+          </a:p>
+          <a:p>
+            <a:r>
+              <a:rPr lang="en-US" dirty="0"/>
+              <a:t>Berkeley DB Java Edition</a:t>
+            </a:r>
+          </a:p>
+          <a:p>
+            <a:r>
+              <a:rPr lang="en-US" dirty="0"/>
+              <a:t>Berkeley DB XML.</a:t>
+            </a:r>
+            <a:endParaRPr lang="en-NL" dirty="0"/>
           </a:p>
         </p:txBody>
       </p:sp>
@@ -7450,7 +7878,7 @@
           <p:cNvPr id="4" name="Picture 3">
             <a:extLst>
               <a:ext uri="{FF2B5EF4-FFF2-40B4-BE49-F238E27FC236}">
-                <a16:creationId xmlns:a16="http://schemas.microsoft.com/office/drawing/2014/main" id="{8E4A5EAB-DDF4-4FB9-B891-B782DEA428D7}"/>
+                <a16:creationId xmlns:a16="http://schemas.microsoft.com/office/drawing/2014/main" id="{73C9021B-ABDA-4350-85FC-BF39EDB3C914}"/>
               </a:ext>
             </a:extLst>
           </p:cNvPr>
@@ -7467,8 +7895,8 @@
         </p:blipFill>
         <p:spPr>
           <a:xfrm>
-            <a:off x="3771087" y="816638"/>
-            <a:ext cx="8016944" cy="3329338"/>
+            <a:off x="4970088" y="2786411"/>
+            <a:ext cx="6935013" cy="2880025"/>
           </a:xfrm>
           <a:prstGeom prst="rect">
             <a:avLst/>
@@ -7480,7 +7908,7 @@
           <p:cNvPr id="5" name="Rectangle 4">
             <a:extLst>
               <a:ext uri="{FF2B5EF4-FFF2-40B4-BE49-F238E27FC236}">
-                <a16:creationId xmlns:a16="http://schemas.microsoft.com/office/drawing/2014/main" id="{1C89EC71-0A53-4274-9083-E500B449356B}"/>
+                <a16:creationId xmlns:a16="http://schemas.microsoft.com/office/drawing/2014/main" id="{78E7F88F-24DB-4A91-BFC5-E4425F9B6272}"/>
               </a:ext>
             </a:extLst>
           </p:cNvPr>
@@ -7489,7 +7917,7 @@
         </p:nvSpPr>
         <p:spPr>
           <a:xfrm>
-            <a:off x="4618307" y="4191499"/>
+            <a:off x="8123507" y="5707079"/>
             <a:ext cx="2754280" cy="215444"/>
           </a:xfrm>
           <a:prstGeom prst="rect">
@@ -7518,7 +7946,7 @@
     </p:spTree>
     <p:extLst>
       <p:ext uri="{BB962C8B-B14F-4D97-AF65-F5344CB8AC3E}">
-        <p14:creationId xmlns:p14="http://schemas.microsoft.com/office/powerpoint/2010/main" val="814098191"/>
+        <p14:creationId xmlns:p14="http://schemas.microsoft.com/office/powerpoint/2010/main" val="3174983479"/>
       </p:ext>
     </p:extLst>
   </p:cSld>
@@ -7531,7 +7959,7 @@
 </p:sld>
 </file>
 
-<file path=ppt/slides/slide12.xml><?xml version="1.0" encoding="utf-8"?>
+<file path=ppt/slides/slide14.xml><?xml version="1.0" encoding="utf-8"?>
 <p:sld xmlns:a="http://schemas.openxmlformats.org/drawingml/2006/main" xmlns:r="http://schemas.openxmlformats.org/officeDocument/2006/relationships" xmlns:p="http://schemas.openxmlformats.org/presentationml/2006/main">
   <p:cSld>
     <p:bg>
@@ -9819,7 +10247,12 @@
             <p:ph type="title"/>
           </p:nvPr>
         </p:nvSpPr>
-        <p:spPr/>
+        <p:spPr>
+          <a:xfrm>
+            <a:off x="677334" y="609600"/>
+            <a:ext cx="8596668" cy="1320800"/>
+          </a:xfrm>
+        </p:spPr>
         <p:txBody>
           <a:bodyPr/>
           <a:lstStyle/>
@@ -9828,6 +10261,7 @@
               <a:rPr lang="nl-NL"/>
               <a:t>When NOT to use</a:t>
             </a:r>
+            <a:endParaRPr lang="nl-NL" dirty="0"/>
           </a:p>
         </p:txBody>
       </p:sp>
@@ -9855,22 +10289,21 @@
           <a:lstStyle/>
           <a:p>
             <a:r>
-              <a:rPr lang="nl-NL"/>
+              <a:rPr lang="nl-NL" dirty="0"/>
               <a:t>Application needs different services</a:t>
             </a:r>
           </a:p>
           <a:p>
             <a:r>
-              <a:rPr lang="nl-NL"/>
+              <a:rPr lang="nl-NL" dirty="0"/>
               <a:t>You can't predict how you need to access your data</a:t>
             </a:r>
           </a:p>
           <a:p>
             <a:r>
-              <a:rPr lang="nl-NL"/>
+              <a:rPr lang="nl-NL" dirty="0"/>
               <a:t>Complex SQL Queries (non key-value queries)</a:t>
             </a:r>
-            <a:endParaRPr lang="nl-NL" dirty="0"/>
           </a:p>
         </p:txBody>
       </p:sp>

</xml_diff>